<commit_message>
Final Machine Name with all Changes in Angular
</commit_message>
<xml_diff>
--- a/Angular/assets/Satva-BuyPaper.pptx
+++ b/Angular/assets/Satva-BuyPaper.pptx
@@ -208,7 +208,7 @@
           <a:p>
             <a:fld id="{3EC66296-D2A7-4625-BDB2-58207B6DED5B}" type="datetimeFigureOut">
               <a:rPr lang="en-US" smtClean="0"/>
-              <a:t>6/13/2021</a:t>
+              <a:t>6/14/2021</a:t>
             </a:fld>
             <a:endParaRPr lang="en-US"/>
           </a:p>
@@ -1575,7 +1575,7 @@
           <a:p>
             <a:fld id="{3443F054-6037-486F-9C04-951762AE8C1F}" type="datetimeFigureOut">
               <a:rPr lang="en-US" smtClean="0"/>
-              <a:t>6/13/2021</a:t>
+              <a:t>6/14/2021</a:t>
             </a:fld>
             <a:endParaRPr lang="en-US"/>
           </a:p>
@@ -1773,7 +1773,7 @@
           <a:p>
             <a:fld id="{3443F054-6037-486F-9C04-951762AE8C1F}" type="datetimeFigureOut">
               <a:rPr lang="en-US" smtClean="0"/>
-              <a:t>6/13/2021</a:t>
+              <a:t>6/14/2021</a:t>
             </a:fld>
             <a:endParaRPr lang="en-US"/>
           </a:p>
@@ -1981,7 +1981,7 @@
           <a:p>
             <a:fld id="{3443F054-6037-486F-9C04-951762AE8C1F}" type="datetimeFigureOut">
               <a:rPr lang="en-US" smtClean="0"/>
-              <a:t>6/13/2021</a:t>
+              <a:t>6/14/2021</a:t>
             </a:fld>
             <a:endParaRPr lang="en-US"/>
           </a:p>
@@ -2179,7 +2179,7 @@
           <a:p>
             <a:fld id="{3443F054-6037-486F-9C04-951762AE8C1F}" type="datetimeFigureOut">
               <a:rPr lang="en-US" smtClean="0"/>
-              <a:t>6/13/2021</a:t>
+              <a:t>6/14/2021</a:t>
             </a:fld>
             <a:endParaRPr lang="en-US"/>
           </a:p>
@@ -2454,7 +2454,7 @@
           <a:p>
             <a:fld id="{3443F054-6037-486F-9C04-951762AE8C1F}" type="datetimeFigureOut">
               <a:rPr lang="en-US" smtClean="0"/>
-              <a:t>6/13/2021</a:t>
+              <a:t>6/14/2021</a:t>
             </a:fld>
             <a:endParaRPr lang="en-US"/>
           </a:p>
@@ -2719,7 +2719,7 @@
           <a:p>
             <a:fld id="{3443F054-6037-486F-9C04-951762AE8C1F}" type="datetimeFigureOut">
               <a:rPr lang="en-US" smtClean="0"/>
-              <a:t>6/13/2021</a:t>
+              <a:t>6/14/2021</a:t>
             </a:fld>
             <a:endParaRPr lang="en-US"/>
           </a:p>
@@ -3131,7 +3131,7 @@
           <a:p>
             <a:fld id="{3443F054-6037-486F-9C04-951762AE8C1F}" type="datetimeFigureOut">
               <a:rPr lang="en-US" smtClean="0"/>
-              <a:t>6/13/2021</a:t>
+              <a:t>6/14/2021</a:t>
             </a:fld>
             <a:endParaRPr lang="en-US"/>
           </a:p>
@@ -3272,7 +3272,7 @@
           <a:p>
             <a:fld id="{3443F054-6037-486F-9C04-951762AE8C1F}" type="datetimeFigureOut">
               <a:rPr lang="en-US" smtClean="0"/>
-              <a:t>6/13/2021</a:t>
+              <a:t>6/14/2021</a:t>
             </a:fld>
             <a:endParaRPr lang="en-US"/>
           </a:p>
@@ -3385,7 +3385,7 @@
           <a:p>
             <a:fld id="{3443F054-6037-486F-9C04-951762AE8C1F}" type="datetimeFigureOut">
               <a:rPr lang="en-US" smtClean="0"/>
-              <a:t>6/13/2021</a:t>
+              <a:t>6/14/2021</a:t>
             </a:fld>
             <a:endParaRPr lang="en-US"/>
           </a:p>
@@ -3696,7 +3696,7 @@
           <a:p>
             <a:fld id="{3443F054-6037-486F-9C04-951762AE8C1F}" type="datetimeFigureOut">
               <a:rPr lang="en-US" smtClean="0"/>
-              <a:t>6/13/2021</a:t>
+              <a:t>6/14/2021</a:t>
             </a:fld>
             <a:endParaRPr lang="en-US"/>
           </a:p>
@@ -3984,7 +3984,7 @@
           <a:p>
             <a:fld id="{3443F054-6037-486F-9C04-951762AE8C1F}" type="datetimeFigureOut">
               <a:rPr lang="en-US" smtClean="0"/>
-              <a:t>6/13/2021</a:t>
+              <a:t>6/14/2021</a:t>
             </a:fld>
             <a:endParaRPr lang="en-US"/>
           </a:p>
@@ -4225,7 +4225,7 @@
           <a:p>
             <a:fld id="{3443F054-6037-486F-9C04-951762AE8C1F}" type="datetimeFigureOut">
               <a:rPr lang="en-US" smtClean="0"/>
-              <a:t>6/13/2021</a:t>
+              <a:t>6/14/2021</a:t>
             </a:fld>
             <a:endParaRPr lang="en-US"/>
           </a:p>
@@ -5090,7 +5090,7 @@
             <a:pPr algn="ctr"/>
             <a:r>
               <a:rPr lang="en-US" sz="2000" dirty="0"/>
-              <a:t>Customer Registration</a:t>
+              <a:t>Customer SignIn</a:t>
             </a:r>
           </a:p>
         </p:txBody>
@@ -5152,7 +5152,7 @@
             <a:pPr algn="ctr"/>
             <a:r>
               <a:rPr lang="en-US" sz="2000" dirty="0"/>
-              <a:t>Consumer Registration </a:t>
+              <a:t>Consumer SignIn </a:t>
             </a:r>
           </a:p>
         </p:txBody>

</xml_diff>

<commit_message>
Final Angular with Static IP
</commit_message>
<xml_diff>
--- a/Angular/assets/Satva-BuyPaper.pptx
+++ b/Angular/assets/Satva-BuyPaper.pptx
@@ -8,10 +8,10 @@
     <p:notesMasterId r:id="rId14"/>
   </p:notesMasterIdLst>
   <p:sldIdLst>
-    <p:sldId id="308" r:id="rId2"/>
+    <p:sldId id="312" r:id="rId2"/>
     <p:sldId id="309" r:id="rId3"/>
     <p:sldId id="310" r:id="rId4"/>
-    <p:sldId id="312" r:id="rId5"/>
+    <p:sldId id="323" r:id="rId5"/>
     <p:sldId id="313" r:id="rId6"/>
     <p:sldId id="315" r:id="rId7"/>
     <p:sldId id="316" r:id="rId8"/>
@@ -521,7 +521,7 @@
           <a:p>
             <a:r>
               <a:rPr lang="en-US" dirty="0"/>
-              <a:t>Customer registration page</a:t>
+              <a:t>Customer login page</a:t>
             </a:r>
           </a:p>
         </p:txBody>
@@ -543,7 +543,7 @@
           <a:p>
             <a:fld id="{65B8C5DF-2898-43F2-A3D3-D32A372F4307}" type="slidenum">
               <a:rPr lang="en-US" smtClean="0"/>
-              <a:t>2</a:t>
+              <a:t>1</a:t>
             </a:fld>
             <a:endParaRPr lang="en-US"/>
           </a:p>
@@ -552,7 +552,7 @@
     </p:spTree>
     <p:extLst>
       <p:ext uri="{BB962C8B-B14F-4D97-AF65-F5344CB8AC3E}">
-        <p14:creationId xmlns:p14="http://schemas.microsoft.com/office/powerpoint/2010/main" val="3262583115"/>
+        <p14:creationId xmlns:p14="http://schemas.microsoft.com/office/powerpoint/2010/main" val="1795862725"/>
       </p:ext>
     </p:extLst>
   </p:cSld>
@@ -627,6 +627,90 @@
           <a:p>
             <a:fld id="{65B8C5DF-2898-43F2-A3D3-D32A372F4307}" type="slidenum">
               <a:rPr lang="en-US" smtClean="0"/>
+              <a:t>10</a:t>
+            </a:fld>
+            <a:endParaRPr lang="en-US"/>
+          </a:p>
+        </p:txBody>
+      </p:sp>
+    </p:spTree>
+    <p:extLst>
+      <p:ext uri="{BB962C8B-B14F-4D97-AF65-F5344CB8AC3E}">
+        <p14:creationId xmlns:p14="http://schemas.microsoft.com/office/powerpoint/2010/main" val="3491081541"/>
+      </p:ext>
+    </p:extLst>
+  </p:cSld>
+  <p:clrMapOvr>
+    <a:masterClrMapping/>
+  </p:clrMapOvr>
+</p:notes>
+</file>
+
+<file path=ppt/notesSlides/notesSlide11.xml><?xml version="1.0" encoding="utf-8"?>
+<p:notes xmlns:a="http://schemas.openxmlformats.org/drawingml/2006/main" xmlns:r="http://schemas.openxmlformats.org/officeDocument/2006/relationships" xmlns:p="http://schemas.openxmlformats.org/presentationml/2006/main">
+  <p:cSld>
+    <p:spTree>
+      <p:nvGrpSpPr>
+        <p:cNvPr id="1" name=""/>
+        <p:cNvGrpSpPr/>
+        <p:nvPr/>
+      </p:nvGrpSpPr>
+      <p:grpSpPr>
+        <a:xfrm>
+          <a:off x="0" y="0"/>
+          <a:ext cx="0" cy="0"/>
+          <a:chOff x="0" y="0"/>
+          <a:chExt cx="0" cy="0"/>
+        </a:xfrm>
+      </p:grpSpPr>
+      <p:sp>
+        <p:nvSpPr>
+          <p:cNvPr id="2" name="Slide Image Placeholder 1"/>
+          <p:cNvSpPr>
+            <a:spLocks noGrp="1" noRot="1" noChangeAspect="1"/>
+          </p:cNvSpPr>
+          <p:nvPr>
+            <p:ph type="sldImg"/>
+          </p:nvPr>
+        </p:nvSpPr>
+        <p:spPr/>
+      </p:sp>
+      <p:sp>
+        <p:nvSpPr>
+          <p:cNvPr id="3" name="Notes Placeholder 2"/>
+          <p:cNvSpPr>
+            <a:spLocks noGrp="1"/>
+          </p:cNvSpPr>
+          <p:nvPr>
+            <p:ph type="body" idx="1"/>
+          </p:nvPr>
+        </p:nvSpPr>
+        <p:spPr/>
+        <p:txBody>
+          <a:bodyPr/>
+          <a:lstStyle/>
+          <a:p>
+            <a:endParaRPr lang="en-US" dirty="0"/>
+          </a:p>
+        </p:txBody>
+      </p:sp>
+      <p:sp>
+        <p:nvSpPr>
+          <p:cNvPr id="4" name="Slide Number Placeholder 3"/>
+          <p:cNvSpPr>
+            <a:spLocks noGrp="1"/>
+          </p:cNvSpPr>
+          <p:nvPr>
+            <p:ph type="sldNum" sz="quarter" idx="5"/>
+          </p:nvPr>
+        </p:nvSpPr>
+        <p:spPr/>
+        <p:txBody>
+          <a:bodyPr/>
+          <a:lstStyle/>
+          <a:p>
+            <a:fld id="{65B8C5DF-2898-43F2-A3D3-D32A372F4307}" type="slidenum">
+              <a:rPr lang="en-US" smtClean="0"/>
               <a:t>11</a:t>
             </a:fld>
             <a:endParaRPr lang="en-US"/>
@@ -646,7 +730,7 @@
 </p:notes>
 </file>
 
-<file path=ppt/notesSlides/notesSlide11.xml><?xml version="1.0" encoding="utf-8"?>
+<file path=ppt/notesSlides/notesSlide12.xml><?xml version="1.0" encoding="utf-8"?>
 <p:notes xmlns:a="http://schemas.openxmlformats.org/drawingml/2006/main" xmlns:r="http://schemas.openxmlformats.org/officeDocument/2006/relationships" xmlns:p="http://schemas.openxmlformats.org/presentationml/2006/main">
   <p:cSld>
     <p:spTree>
@@ -774,30 +858,10 @@
           <a:bodyPr/>
           <a:lstStyle/>
           <a:p>
-            <a:pPr marL="0" marR="0" lvl="0" indent="0" algn="l" defTabSz="914400" rtl="0" eaLnBrk="1" fontAlgn="auto" latinLnBrk="0" hangingPunct="1">
-              <a:lnSpc>
-                <a:spcPct val="100000"/>
-              </a:lnSpc>
-              <a:spcBef>
-                <a:spcPts val="0"/>
-              </a:spcBef>
-              <a:spcAft>
-                <a:spcPts val="0"/>
-              </a:spcAft>
-              <a:buClrTx/>
-              <a:buSzTx/>
-              <a:buFontTx/>
-              <a:buNone/>
-              <a:tabLst/>
-              <a:defRPr/>
-            </a:pPr>
             <a:r>
               <a:rPr lang="en-US" dirty="0"/>
-              <a:t>Customer registration page cont1</a:t>
-            </a:r>
-          </a:p>
-          <a:p>
-            <a:endParaRPr lang="en-US" dirty="0"/>
+              <a:t>Customer registration page</a:t>
+            </a:r>
           </a:p>
         </p:txBody>
       </p:sp>
@@ -818,7 +882,7 @@
           <a:p>
             <a:fld id="{65B8C5DF-2898-43F2-A3D3-D32A372F4307}" type="slidenum">
               <a:rPr lang="en-US" smtClean="0"/>
-              <a:t>3</a:t>
+              <a:t>2</a:t>
             </a:fld>
             <a:endParaRPr lang="en-US"/>
           </a:p>
@@ -827,7 +891,7 @@
     </p:spTree>
     <p:extLst>
       <p:ext uri="{BB962C8B-B14F-4D97-AF65-F5344CB8AC3E}">
-        <p14:creationId xmlns:p14="http://schemas.microsoft.com/office/powerpoint/2010/main" val="3405978160"/>
+        <p14:creationId xmlns:p14="http://schemas.microsoft.com/office/powerpoint/2010/main" val="3262583115"/>
       </p:ext>
     </p:extLst>
   </p:cSld>
@@ -881,10 +945,30 @@
           <a:bodyPr/>
           <a:lstStyle/>
           <a:p>
+            <a:pPr marL="0" marR="0" lvl="0" indent="0" algn="l" defTabSz="914400" rtl="0" eaLnBrk="1" fontAlgn="auto" latinLnBrk="0" hangingPunct="1">
+              <a:lnSpc>
+                <a:spcPct val="100000"/>
+              </a:lnSpc>
+              <a:spcBef>
+                <a:spcPts val="0"/>
+              </a:spcBef>
+              <a:spcAft>
+                <a:spcPts val="0"/>
+              </a:spcAft>
+              <a:buClrTx/>
+              <a:buSzTx/>
+              <a:buFontTx/>
+              <a:buNone/>
+              <a:tabLst/>
+              <a:defRPr/>
+            </a:pPr>
             <a:r>
               <a:rPr lang="en-US" dirty="0"/>
-              <a:t>Customer login page</a:t>
-            </a:r>
+              <a:t>Customer registration page cont1</a:t>
+            </a:r>
+          </a:p>
+          <a:p>
+            <a:endParaRPr lang="en-US" dirty="0"/>
           </a:p>
         </p:txBody>
       </p:sp>
@@ -905,7 +989,7 @@
           <a:p>
             <a:fld id="{65B8C5DF-2898-43F2-A3D3-D32A372F4307}" type="slidenum">
               <a:rPr lang="en-US" smtClean="0"/>
-              <a:t>4</a:t>
+              <a:t>3</a:t>
             </a:fld>
             <a:endParaRPr lang="en-US"/>
           </a:p>
@@ -914,7 +998,7 @@
     </p:spTree>
     <p:extLst>
       <p:ext uri="{BB962C8B-B14F-4D97-AF65-F5344CB8AC3E}">
-        <p14:creationId xmlns:p14="http://schemas.microsoft.com/office/powerpoint/2010/main" val="1795862725"/>
+        <p14:creationId xmlns:p14="http://schemas.microsoft.com/office/powerpoint/2010/main" val="3405978160"/>
       </p:ext>
     </p:extLst>
   </p:cSld>
@@ -968,7 +1052,10 @@
           <a:bodyPr/>
           <a:lstStyle/>
           <a:p>
-            <a:endParaRPr lang="en-US" dirty="0"/>
+            <a:r>
+              <a:rPr lang="en-US" dirty="0"/>
+              <a:t>Customer login page</a:t>
+            </a:r>
           </a:p>
         </p:txBody>
       </p:sp>
@@ -989,7 +1076,7 @@
           <a:p>
             <a:fld id="{65B8C5DF-2898-43F2-A3D3-D32A372F4307}" type="slidenum">
               <a:rPr lang="en-US" smtClean="0"/>
-              <a:t>5</a:t>
+              <a:t>4</a:t>
             </a:fld>
             <a:endParaRPr lang="en-US"/>
           </a:p>
@@ -998,7 +1085,7 @@
     </p:spTree>
     <p:extLst>
       <p:ext uri="{BB962C8B-B14F-4D97-AF65-F5344CB8AC3E}">
-        <p14:creationId xmlns:p14="http://schemas.microsoft.com/office/powerpoint/2010/main" val="254504979"/>
+        <p14:creationId xmlns:p14="http://schemas.microsoft.com/office/powerpoint/2010/main" val="780285111"/>
       </p:ext>
     </p:extLst>
   </p:cSld>
@@ -1073,7 +1160,7 @@
           <a:p>
             <a:fld id="{65B8C5DF-2898-43F2-A3D3-D32A372F4307}" type="slidenum">
               <a:rPr lang="en-US" smtClean="0"/>
-              <a:t>6</a:t>
+              <a:t>5</a:t>
             </a:fld>
             <a:endParaRPr lang="en-US"/>
           </a:p>
@@ -1082,7 +1169,7 @@
     </p:spTree>
     <p:extLst>
       <p:ext uri="{BB962C8B-B14F-4D97-AF65-F5344CB8AC3E}">
-        <p14:creationId xmlns:p14="http://schemas.microsoft.com/office/powerpoint/2010/main" val="794308015"/>
+        <p14:creationId xmlns:p14="http://schemas.microsoft.com/office/powerpoint/2010/main" val="254504979"/>
       </p:ext>
     </p:extLst>
   </p:cSld>
@@ -1157,7 +1244,7 @@
           <a:p>
             <a:fld id="{65B8C5DF-2898-43F2-A3D3-D32A372F4307}" type="slidenum">
               <a:rPr lang="en-US" smtClean="0"/>
-              <a:t>7</a:t>
+              <a:t>6</a:t>
             </a:fld>
             <a:endParaRPr lang="en-US"/>
           </a:p>
@@ -1166,7 +1253,7 @@
     </p:spTree>
     <p:extLst>
       <p:ext uri="{BB962C8B-B14F-4D97-AF65-F5344CB8AC3E}">
-        <p14:creationId xmlns:p14="http://schemas.microsoft.com/office/powerpoint/2010/main" val="2749862021"/>
+        <p14:creationId xmlns:p14="http://schemas.microsoft.com/office/powerpoint/2010/main" val="794308015"/>
       </p:ext>
     </p:extLst>
   </p:cSld>
@@ -1241,7 +1328,7 @@
           <a:p>
             <a:fld id="{65B8C5DF-2898-43F2-A3D3-D32A372F4307}" type="slidenum">
               <a:rPr lang="en-US" smtClean="0"/>
-              <a:t>8</a:t>
+              <a:t>7</a:t>
             </a:fld>
             <a:endParaRPr lang="en-US"/>
           </a:p>
@@ -1250,7 +1337,7 @@
     </p:spTree>
     <p:extLst>
       <p:ext uri="{BB962C8B-B14F-4D97-AF65-F5344CB8AC3E}">
-        <p14:creationId xmlns:p14="http://schemas.microsoft.com/office/powerpoint/2010/main" val="1123550905"/>
+        <p14:creationId xmlns:p14="http://schemas.microsoft.com/office/powerpoint/2010/main" val="2749862021"/>
       </p:ext>
     </p:extLst>
   </p:cSld>
@@ -1325,7 +1412,7 @@
           <a:p>
             <a:fld id="{65B8C5DF-2898-43F2-A3D3-D32A372F4307}" type="slidenum">
               <a:rPr lang="en-US" smtClean="0"/>
-              <a:t>9</a:t>
+              <a:t>8</a:t>
             </a:fld>
             <a:endParaRPr lang="en-US"/>
           </a:p>
@@ -1334,7 +1421,7 @@
     </p:spTree>
     <p:extLst>
       <p:ext uri="{BB962C8B-B14F-4D97-AF65-F5344CB8AC3E}">
-        <p14:creationId xmlns:p14="http://schemas.microsoft.com/office/powerpoint/2010/main" val="3009870011"/>
+        <p14:creationId xmlns:p14="http://schemas.microsoft.com/office/powerpoint/2010/main" val="1123550905"/>
       </p:ext>
     </p:extLst>
   </p:cSld>
@@ -1409,7 +1496,7 @@
           <a:p>
             <a:fld id="{65B8C5DF-2898-43F2-A3D3-D32A372F4307}" type="slidenum">
               <a:rPr lang="en-US" smtClean="0"/>
-              <a:t>10</a:t>
+              <a:t>9</a:t>
             </a:fld>
             <a:endParaRPr lang="en-US"/>
           </a:p>
@@ -1418,7 +1505,7 @@
     </p:spTree>
     <p:extLst>
       <p:ext uri="{BB962C8B-B14F-4D97-AF65-F5344CB8AC3E}">
-        <p14:creationId xmlns:p14="http://schemas.microsoft.com/office/powerpoint/2010/main" val="3491081541"/>
+        <p14:creationId xmlns:p14="http://schemas.microsoft.com/office/powerpoint/2010/main" val="3009870011"/>
       </p:ext>
     </p:extLst>
   </p:cSld>
@@ -4644,401 +4731,10 @@
       </p:grpSpPr>
       <p:sp>
         <p:nvSpPr>
-          <p:cNvPr id="6" name="TextBox 5">
-            <a:extLst>
-              <a:ext uri="{FF2B5EF4-FFF2-40B4-BE49-F238E27FC236}">
-                <a16:creationId xmlns:a16="http://schemas.microsoft.com/office/drawing/2014/main" id="{8A37518F-962D-4B02-B3E0-DC2439FA2B8D}"/>
-              </a:ext>
-            </a:extLst>
-          </p:cNvPr>
-          <p:cNvSpPr txBox="1"/>
-          <p:nvPr/>
-        </p:nvSpPr>
-        <p:spPr>
-          <a:xfrm>
-            <a:off x="3262218" y="855892"/>
-            <a:ext cx="2447779" cy="584775"/>
-          </a:xfrm>
-          <a:prstGeom prst="rect">
-            <a:avLst/>
-          </a:prstGeom>
-          <a:noFill/>
-        </p:spPr>
-        <p:txBody>
-          <a:bodyPr wrap="square" rtlCol="0">
-            <a:spAutoFit/>
-          </a:bodyPr>
-          <a:lstStyle/>
-          <a:p>
-            <a:r>
-              <a:rPr lang="en-US" sz="3200" b="1" dirty="0"/>
-              <a:t>SELL</a:t>
-            </a:r>
-            <a:r>
-              <a:rPr lang="en-US" sz="3200" dirty="0"/>
-              <a:t> Paper</a:t>
-            </a:r>
-          </a:p>
-        </p:txBody>
-      </p:sp>
-      <p:sp>
-        <p:nvSpPr>
-          <p:cNvPr id="7" name="TextBox 6">
-            <a:extLst>
-              <a:ext uri="{FF2B5EF4-FFF2-40B4-BE49-F238E27FC236}">
-                <a16:creationId xmlns:a16="http://schemas.microsoft.com/office/drawing/2014/main" id="{1CBA73D1-5A97-4E35-84D9-471DFED7808E}"/>
-              </a:ext>
-            </a:extLst>
-          </p:cNvPr>
-          <p:cNvSpPr txBox="1"/>
-          <p:nvPr/>
-        </p:nvSpPr>
-        <p:spPr>
-          <a:xfrm>
-            <a:off x="3262218" y="3817918"/>
-            <a:ext cx="2250833" cy="584775"/>
-          </a:xfrm>
-          <a:prstGeom prst="rect">
-            <a:avLst/>
-          </a:prstGeom>
-          <a:noFill/>
-        </p:spPr>
-        <p:txBody>
-          <a:bodyPr wrap="square" rtlCol="0">
-            <a:spAutoFit/>
-          </a:bodyPr>
-          <a:lstStyle/>
-          <a:p>
-            <a:r>
-              <a:rPr lang="en-US" sz="3200" b="1" dirty="0"/>
-              <a:t>BUY</a:t>
-            </a:r>
-            <a:r>
-              <a:rPr lang="en-US" sz="3200" dirty="0"/>
-              <a:t> Paper</a:t>
-            </a:r>
-          </a:p>
-        </p:txBody>
-      </p:sp>
-      <p:grpSp>
-        <p:nvGrpSpPr>
-          <p:cNvPr id="34" name="Group 33">
-            <a:extLst>
-              <a:ext uri="{FF2B5EF4-FFF2-40B4-BE49-F238E27FC236}">
-                <a16:creationId xmlns:a16="http://schemas.microsoft.com/office/drawing/2014/main" id="{C015BB60-E275-44E5-80C4-0E51E0F33D16}"/>
-              </a:ext>
-            </a:extLst>
-          </p:cNvPr>
-          <p:cNvGrpSpPr/>
-          <p:nvPr/>
-        </p:nvGrpSpPr>
-        <p:grpSpPr>
-          <a:xfrm>
-            <a:off x="667598" y="959000"/>
-            <a:ext cx="2389902" cy="1972329"/>
-            <a:chOff x="667598" y="959000"/>
-            <a:chExt cx="2389902" cy="1972329"/>
-          </a:xfrm>
-        </p:grpSpPr>
-        <p:pic>
-          <p:nvPicPr>
-            <p:cNvPr id="10" name="Picture 9" descr="Icon&#10;&#10;Description automatically generated">
-              <a:extLst>
-                <a:ext uri="{FF2B5EF4-FFF2-40B4-BE49-F238E27FC236}">
-                  <a16:creationId xmlns:a16="http://schemas.microsoft.com/office/drawing/2014/main" id="{1DE635E7-28B9-4898-B96E-C71E64937D55}"/>
-                </a:ext>
-              </a:extLst>
-            </p:cNvPr>
-            <p:cNvPicPr>
-              <a:picLocks noChangeAspect="1"/>
-            </p:cNvPicPr>
-            <p:nvPr/>
-          </p:nvPicPr>
-          <p:blipFill>
-            <a:blip r:embed="rId2">
-              <a:extLst>
-                <a:ext uri="{28A0092B-C50C-407E-A947-70E740481C1C}">
-                  <a14:useLocalDpi xmlns:a14="http://schemas.microsoft.com/office/drawing/2010/main" val="0"/>
-                </a:ext>
-                <a:ext uri="{837473B0-CC2E-450A-ABE3-18F120FF3D39}">
-                  <a1611:picAttrSrcUrl xmlns:a1611="http://schemas.microsoft.com/office/drawing/2016/11/main" r:id="rId3"/>
-                </a:ext>
-              </a:extLst>
-            </a:blip>
-            <a:stretch>
-              <a:fillRect/>
-            </a:stretch>
-          </p:blipFill>
-          <p:spPr>
-            <a:xfrm>
-              <a:off x="667598" y="959000"/>
-              <a:ext cx="1899090" cy="1899090"/>
-            </a:xfrm>
-            <a:prstGeom prst="rect">
-              <a:avLst/>
-            </a:prstGeom>
-          </p:spPr>
-        </p:pic>
-        <p:pic>
-          <p:nvPicPr>
-            <p:cNvPr id="22" name="Picture 21">
-              <a:extLst>
-                <a:ext uri="{FF2B5EF4-FFF2-40B4-BE49-F238E27FC236}">
-                  <a16:creationId xmlns:a16="http://schemas.microsoft.com/office/drawing/2014/main" id="{529EB101-920C-4C8E-AEB0-FE856C0FFA41}"/>
-                </a:ext>
-              </a:extLst>
-            </p:cNvPr>
-            <p:cNvPicPr>
-              <a:picLocks noChangeAspect="1"/>
-            </p:cNvPicPr>
-            <p:nvPr/>
-          </p:nvPicPr>
-          <p:blipFill>
-            <a:blip r:embed="rId4">
-              <a:extLst>
-                <a:ext uri="{BEBA8EAE-BF5A-486C-A8C5-ECC9F3942E4B}">
-                  <a14:imgProps xmlns:a14="http://schemas.microsoft.com/office/drawing/2010/main">
-                    <a14:imgLayer r:embed="rId5">
-                      <a14:imgEffect>
-                        <a14:colorTemperature colorTemp="4700"/>
-                      </a14:imgEffect>
-                    </a14:imgLayer>
-                  </a14:imgProps>
-                </a:ext>
-                <a:ext uri="{28A0092B-C50C-407E-A947-70E740481C1C}">
-                  <a14:useLocalDpi xmlns:a14="http://schemas.microsoft.com/office/drawing/2010/main" val="0"/>
-                </a:ext>
-                <a:ext uri="{837473B0-CC2E-450A-ABE3-18F120FF3D39}">
-                  <a1611:picAttrSrcUrl xmlns:a1611="http://schemas.microsoft.com/office/drawing/2016/11/main" r:id="rId6"/>
-                </a:ext>
-              </a:extLst>
-            </a:blip>
-            <a:stretch>
-              <a:fillRect/>
-            </a:stretch>
-          </p:blipFill>
-          <p:spPr>
-            <a:xfrm>
-              <a:off x="1979241" y="1852192"/>
-              <a:ext cx="1078259" cy="1079137"/>
-            </a:xfrm>
-            <a:prstGeom prst="rect">
-              <a:avLst/>
-            </a:prstGeom>
-          </p:spPr>
-        </p:pic>
-      </p:grpSp>
-      <p:grpSp>
-        <p:nvGrpSpPr>
-          <p:cNvPr id="35" name="Group 34">
-            <a:extLst>
-              <a:ext uri="{FF2B5EF4-FFF2-40B4-BE49-F238E27FC236}">
-                <a16:creationId xmlns:a16="http://schemas.microsoft.com/office/drawing/2014/main" id="{A41992E3-CD09-4098-B87A-3C6336558398}"/>
-              </a:ext>
-            </a:extLst>
-          </p:cNvPr>
-          <p:cNvGrpSpPr/>
-          <p:nvPr/>
-        </p:nvGrpSpPr>
-        <p:grpSpPr>
-          <a:xfrm>
-            <a:off x="792264" y="3857688"/>
-            <a:ext cx="2158317" cy="1851018"/>
-            <a:chOff x="792264" y="3857688"/>
-            <a:chExt cx="2158317" cy="1851018"/>
-          </a:xfrm>
-        </p:grpSpPr>
-        <p:pic>
-          <p:nvPicPr>
-            <p:cNvPr id="25" name="Picture 24">
-              <a:extLst>
-                <a:ext uri="{FF2B5EF4-FFF2-40B4-BE49-F238E27FC236}">
-                  <a16:creationId xmlns:a16="http://schemas.microsoft.com/office/drawing/2014/main" id="{1CDF0C36-FE2C-4141-903D-A7690B8CCA3A}"/>
-                </a:ext>
-              </a:extLst>
-            </p:cNvPr>
-            <p:cNvPicPr>
-              <a:picLocks noChangeAspect="1"/>
-            </p:cNvPicPr>
-            <p:nvPr/>
-          </p:nvPicPr>
-          <p:blipFill>
-            <a:blip r:embed="rId7">
-              <a:alphaModFix/>
-              <a:duotone>
-                <a:schemeClr val="accent1">
-                  <a:shade val="45000"/>
-                  <a:satMod val="135000"/>
-                </a:schemeClr>
-                <a:prstClr val="white"/>
-              </a:duotone>
-              <a:extLst>
-                <a:ext uri="{BEBA8EAE-BF5A-486C-A8C5-ECC9F3942E4B}">
-                  <a14:imgProps xmlns:a14="http://schemas.microsoft.com/office/drawing/2010/main">
-                    <a14:imgLayer r:embed="rId8">
-                      <a14:imgEffect>
-                        <a14:colorTemperature colorTemp="11200"/>
-                      </a14:imgEffect>
-                      <a14:imgEffect>
-                        <a14:brightnessContrast bright="40000" contrast="20000"/>
-                      </a14:imgEffect>
-                    </a14:imgLayer>
-                  </a14:imgProps>
-                </a:ext>
-                <a:ext uri="{28A0092B-C50C-407E-A947-70E740481C1C}">
-                  <a14:useLocalDpi xmlns:a14="http://schemas.microsoft.com/office/drawing/2010/main" val="0"/>
-                </a:ext>
-                <a:ext uri="{837473B0-CC2E-450A-ABE3-18F120FF3D39}">
-                  <a1611:picAttrSrcUrl xmlns:a1611="http://schemas.microsoft.com/office/drawing/2016/11/main" r:id="rId9"/>
-                </a:ext>
-              </a:extLst>
-            </a:blip>
-            <a:stretch>
-              <a:fillRect/>
-            </a:stretch>
-          </p:blipFill>
-          <p:spPr>
-            <a:xfrm>
-              <a:off x="1326359" y="4084484"/>
-              <a:ext cx="1624222" cy="1624222"/>
-            </a:xfrm>
-            <a:prstGeom prst="rect">
-              <a:avLst/>
-            </a:prstGeom>
-          </p:spPr>
-        </p:pic>
-        <p:pic>
-          <p:nvPicPr>
-            <p:cNvPr id="13" name="Picture 12">
-              <a:extLst>
-                <a:ext uri="{FF2B5EF4-FFF2-40B4-BE49-F238E27FC236}">
-                  <a16:creationId xmlns:a16="http://schemas.microsoft.com/office/drawing/2014/main" id="{CD04AAF0-E819-4B10-A6F0-E872DDA3B7DE}"/>
-                </a:ext>
-              </a:extLst>
-            </p:cNvPr>
-            <p:cNvPicPr>
-              <a:picLocks noChangeAspect="1"/>
-            </p:cNvPicPr>
-            <p:nvPr/>
-          </p:nvPicPr>
-          <p:blipFill>
-            <a:blip r:embed="rId10">
-              <a:extLst>
-                <a:ext uri="{28A0092B-C50C-407E-A947-70E740481C1C}">
-                  <a14:useLocalDpi xmlns:a14="http://schemas.microsoft.com/office/drawing/2010/main" val="0"/>
-                </a:ext>
-                <a:ext uri="{837473B0-CC2E-450A-ABE3-18F120FF3D39}">
-                  <a1611:picAttrSrcUrl xmlns:a1611="http://schemas.microsoft.com/office/drawing/2016/11/main" r:id="rId11"/>
-                </a:ext>
-              </a:extLst>
-            </a:blip>
-            <a:stretch>
-              <a:fillRect/>
-            </a:stretch>
-          </p:blipFill>
-          <p:spPr>
-            <a:xfrm>
-              <a:off x="792264" y="3857688"/>
-              <a:ext cx="1292408" cy="1292408"/>
-            </a:xfrm>
-            <a:prstGeom prst="rect">
-              <a:avLst/>
-            </a:prstGeom>
-          </p:spPr>
-        </p:pic>
-      </p:grpSp>
-      <p:sp>
-        <p:nvSpPr>
-          <p:cNvPr id="29" name="TextBox 28">
-            <a:extLst>
-              <a:ext uri="{FF2B5EF4-FFF2-40B4-BE49-F238E27FC236}">
-                <a16:creationId xmlns:a16="http://schemas.microsoft.com/office/drawing/2014/main" id="{EC2B856C-003D-4648-9354-295F9FB852B2}"/>
-              </a:ext>
-            </a:extLst>
-          </p:cNvPr>
-          <p:cNvSpPr txBox="1"/>
-          <p:nvPr/>
-        </p:nvSpPr>
-        <p:spPr>
-          <a:xfrm>
-            <a:off x="3262218" y="1334596"/>
-            <a:ext cx="8204067" cy="646331"/>
-          </a:xfrm>
-          <a:prstGeom prst="rect">
-            <a:avLst/>
-          </a:prstGeom>
-          <a:noFill/>
-        </p:spPr>
-        <p:txBody>
-          <a:bodyPr wrap="square" rtlCol="0">
-            <a:spAutoFit/>
-          </a:bodyPr>
-          <a:lstStyle/>
-          <a:p>
-            <a:r>
-              <a:rPr lang="en-US" dirty="0"/>
-              <a:t>If you are a </a:t>
-            </a:r>
-            <a:r>
-              <a:rPr lang="en-US" b="1" dirty="0"/>
-              <a:t>customer </a:t>
-            </a:r>
-            <a:r>
-              <a:rPr lang="en-US" dirty="0"/>
-              <a:t>having lots of papers and want to recycle them, then register with us and we will collect the paper and earn credits.</a:t>
-            </a:r>
-          </a:p>
-        </p:txBody>
-      </p:sp>
-      <p:sp>
-        <p:nvSpPr>
-          <p:cNvPr id="30" name="TextBox 29">
-            <a:extLst>
-              <a:ext uri="{FF2B5EF4-FFF2-40B4-BE49-F238E27FC236}">
-                <a16:creationId xmlns:a16="http://schemas.microsoft.com/office/drawing/2014/main" id="{9548B31F-8EAF-43D5-B8DA-B23A0A0E6E2E}"/>
-              </a:ext>
-            </a:extLst>
-          </p:cNvPr>
-          <p:cNvSpPr txBox="1"/>
-          <p:nvPr/>
-        </p:nvSpPr>
-        <p:spPr>
-          <a:xfrm>
-            <a:off x="3262218" y="4358178"/>
-            <a:ext cx="8204066" cy="646331"/>
-          </a:xfrm>
-          <a:prstGeom prst="rect">
-            <a:avLst/>
-          </a:prstGeom>
-          <a:noFill/>
-        </p:spPr>
-        <p:txBody>
-          <a:bodyPr wrap="square" rtlCol="0">
-            <a:spAutoFit/>
-          </a:bodyPr>
-          <a:lstStyle/>
-          <a:p>
-            <a:r>
-              <a:rPr lang="en-US" dirty="0"/>
-              <a:t>If you are a </a:t>
-            </a:r>
-            <a:r>
-              <a:rPr lang="en-US" b="1" dirty="0"/>
-              <a:t>paper recycling company </a:t>
-            </a:r>
-            <a:r>
-              <a:rPr lang="en-US" dirty="0"/>
-              <a:t>looking for paper raw materials, then register with us and provide us your requirement.  </a:t>
-            </a:r>
-          </a:p>
-        </p:txBody>
-      </p:sp>
-      <p:sp>
-        <p:nvSpPr>
-          <p:cNvPr id="31" name="Rectangle 30">
-            <a:extLst>
-              <a:ext uri="{FF2B5EF4-FFF2-40B4-BE49-F238E27FC236}">
-                <a16:creationId xmlns:a16="http://schemas.microsoft.com/office/drawing/2014/main" id="{F4FDFBA2-729E-45E6-AC83-4A95F63E1D27}"/>
+          <p:cNvPr id="16" name="Rectangle 15">
+            <a:extLst>
+              <a:ext uri="{FF2B5EF4-FFF2-40B4-BE49-F238E27FC236}">
+                <a16:creationId xmlns:a16="http://schemas.microsoft.com/office/drawing/2014/main" id="{933738E2-DB0E-4F23-ABA6-E0FEDE201CB9}"/>
               </a:ext>
             </a:extLst>
           </p:cNvPr>
@@ -5047,17 +4743,19 @@
         </p:nvSpPr>
         <p:spPr>
           <a:xfrm>
-            <a:off x="3349301" y="2108948"/>
-            <a:ext cx="2746699" cy="584775"/>
+            <a:off x="4978400" y="2730274"/>
+            <a:ext cx="3294743" cy="417286"/>
           </a:xfrm>
           <a:prstGeom prst="rect">
             <a:avLst/>
           </a:prstGeom>
           <a:solidFill>
-            <a:srgbClr val="459923"/>
+            <a:schemeClr val="bg1"/>
           </a:solidFill>
           <a:ln>
-            <a:noFill/>
+            <a:solidFill>
+              <a:schemeClr val="tx1"/>
+            </a:solidFill>
           </a:ln>
           <a:effectLst>
             <a:outerShdw blurRad="50800" dist="38100" dir="2700000" algn="tl" rotWithShape="0">
@@ -5088,19 +4786,86 @@
           <a:lstStyle/>
           <a:p>
             <a:pPr algn="ctr"/>
+            <a:endParaRPr lang="en-US"/>
+          </a:p>
+        </p:txBody>
+      </p:sp>
+      <p:sp>
+        <p:nvSpPr>
+          <p:cNvPr id="18" name="TextBox 17">
+            <a:extLst>
+              <a:ext uri="{FF2B5EF4-FFF2-40B4-BE49-F238E27FC236}">
+                <a16:creationId xmlns:a16="http://schemas.microsoft.com/office/drawing/2014/main" id="{B7D1723D-8988-48BF-9057-E940862B2B1A}"/>
+              </a:ext>
+            </a:extLst>
+          </p:cNvPr>
+          <p:cNvSpPr txBox="1"/>
+          <p:nvPr/>
+        </p:nvSpPr>
+        <p:spPr>
+          <a:xfrm>
+            <a:off x="3337831" y="2728087"/>
+            <a:ext cx="2046128" cy="400110"/>
+          </a:xfrm>
+          <a:prstGeom prst="rect">
+            <a:avLst/>
+          </a:prstGeom>
+          <a:noFill/>
+        </p:spPr>
+        <p:txBody>
+          <a:bodyPr wrap="square" rtlCol="0">
+            <a:spAutoFit/>
+          </a:bodyPr>
+          <a:lstStyle/>
+          <a:p>
             <a:r>
               <a:rPr lang="en-US" sz="2000" dirty="0"/>
-              <a:t>Customer SignIn</a:t>
-            </a:r>
-          </a:p>
-        </p:txBody>
-      </p:sp>
-      <p:sp>
-        <p:nvSpPr>
-          <p:cNvPr id="33" name="Rectangle 32">
-            <a:extLst>
-              <a:ext uri="{FF2B5EF4-FFF2-40B4-BE49-F238E27FC236}">
-                <a16:creationId xmlns:a16="http://schemas.microsoft.com/office/drawing/2014/main" id="{F34FEBC4-EFBA-4036-B66C-4FFA2B70C91B}"/>
+              <a:t>Consumer ID:</a:t>
+            </a:r>
+          </a:p>
+        </p:txBody>
+      </p:sp>
+      <p:sp>
+        <p:nvSpPr>
+          <p:cNvPr id="19" name="TextBox 18">
+            <a:extLst>
+              <a:ext uri="{FF2B5EF4-FFF2-40B4-BE49-F238E27FC236}">
+                <a16:creationId xmlns:a16="http://schemas.microsoft.com/office/drawing/2014/main" id="{EC1DD84C-921F-4AD7-A933-F14B97B71E0B}"/>
+              </a:ext>
+            </a:extLst>
+          </p:cNvPr>
+          <p:cNvSpPr txBox="1"/>
+          <p:nvPr/>
+        </p:nvSpPr>
+        <p:spPr>
+          <a:xfrm>
+            <a:off x="3337831" y="3563694"/>
+            <a:ext cx="2046128" cy="400110"/>
+          </a:xfrm>
+          <a:prstGeom prst="rect">
+            <a:avLst/>
+          </a:prstGeom>
+          <a:noFill/>
+        </p:spPr>
+        <p:txBody>
+          <a:bodyPr wrap="square" rtlCol="0">
+            <a:spAutoFit/>
+          </a:bodyPr>
+          <a:lstStyle/>
+          <a:p>
+            <a:r>
+              <a:rPr lang="en-US" sz="2000" dirty="0"/>
+              <a:t>Password:</a:t>
+            </a:r>
+          </a:p>
+        </p:txBody>
+      </p:sp>
+      <p:sp>
+        <p:nvSpPr>
+          <p:cNvPr id="20" name="Rectangle 19">
+            <a:extLst>
+              <a:ext uri="{FF2B5EF4-FFF2-40B4-BE49-F238E27FC236}">
+                <a16:creationId xmlns:a16="http://schemas.microsoft.com/office/drawing/2014/main" id="{562B31D6-4689-4D4F-B635-A7387707EB5D}"/>
               </a:ext>
             </a:extLst>
           </p:cNvPr>
@@ -5109,8 +4874,69 @@
         </p:nvSpPr>
         <p:spPr>
           <a:xfrm>
-            <a:off x="3349302" y="5129148"/>
-            <a:ext cx="2746698" cy="584775"/>
+            <a:off x="4978400" y="3541888"/>
+            <a:ext cx="3294743" cy="417286"/>
+          </a:xfrm>
+          <a:prstGeom prst="rect">
+            <a:avLst/>
+          </a:prstGeom>
+          <a:solidFill>
+            <a:schemeClr val="bg1"/>
+          </a:solidFill>
+          <a:ln>
+            <a:solidFill>
+              <a:schemeClr val="tx1"/>
+            </a:solidFill>
+          </a:ln>
+          <a:effectLst>
+            <a:outerShdw blurRad="50800" dist="38100" dir="2700000" algn="tl" rotWithShape="0">
+              <a:prstClr val="black">
+                <a:alpha val="40000"/>
+              </a:prstClr>
+            </a:outerShdw>
+          </a:effectLst>
+        </p:spPr>
+        <p:style>
+          <a:lnRef idx="2">
+            <a:schemeClr val="accent1">
+              <a:shade val="50000"/>
+            </a:schemeClr>
+          </a:lnRef>
+          <a:fillRef idx="1">
+            <a:schemeClr val="accent1"/>
+          </a:fillRef>
+          <a:effectRef idx="0">
+            <a:schemeClr val="accent1"/>
+          </a:effectRef>
+          <a:fontRef idx="minor">
+            <a:schemeClr val="lt1"/>
+          </a:fontRef>
+        </p:style>
+        <p:txBody>
+          <a:bodyPr rtlCol="0" anchor="ctr"/>
+          <a:lstStyle/>
+          <a:p>
+            <a:pPr algn="ctr"/>
+            <a:endParaRPr lang="en-US"/>
+          </a:p>
+        </p:txBody>
+      </p:sp>
+      <p:sp>
+        <p:nvSpPr>
+          <p:cNvPr id="21" name="Rectangle 20">
+            <a:extLst>
+              <a:ext uri="{FF2B5EF4-FFF2-40B4-BE49-F238E27FC236}">
+                <a16:creationId xmlns:a16="http://schemas.microsoft.com/office/drawing/2014/main" id="{9F8F67DD-4667-4FE4-97F7-08F93EEC36EA}"/>
+              </a:ext>
+            </a:extLst>
+          </p:cNvPr>
+          <p:cNvSpPr/>
+          <p:nvPr/>
+        </p:nvSpPr>
+        <p:spPr>
+          <a:xfrm>
+            <a:off x="5667828" y="4353502"/>
+            <a:ext cx="1915886" cy="417287"/>
           </a:xfrm>
           <a:prstGeom prst="rect">
             <a:avLst/>
@@ -5152,7 +4978,406 @@
             <a:pPr algn="ctr"/>
             <a:r>
               <a:rPr lang="en-US" sz="2000" dirty="0"/>
-              <a:t>Consumer SignIn </a:t>
+              <a:t>Login</a:t>
+            </a:r>
+          </a:p>
+        </p:txBody>
+      </p:sp>
+      <p:sp>
+        <p:nvSpPr>
+          <p:cNvPr id="22" name="TextBox 21">
+            <a:extLst>
+              <a:ext uri="{FF2B5EF4-FFF2-40B4-BE49-F238E27FC236}">
+                <a16:creationId xmlns:a16="http://schemas.microsoft.com/office/drawing/2014/main" id="{1850BD85-8050-4558-B06B-3842AFFFDD25}"/>
+              </a:ext>
+            </a:extLst>
+          </p:cNvPr>
+          <p:cNvSpPr txBox="1"/>
+          <p:nvPr/>
+        </p:nvSpPr>
+        <p:spPr>
+          <a:xfrm>
+            <a:off x="5426531" y="4832024"/>
+            <a:ext cx="3831325" cy="369332"/>
+          </a:xfrm>
+          <a:prstGeom prst="rect">
+            <a:avLst/>
+          </a:prstGeom>
+          <a:noFill/>
+        </p:spPr>
+        <p:txBody>
+          <a:bodyPr wrap="square" rtlCol="0">
+            <a:spAutoFit/>
+          </a:bodyPr>
+          <a:lstStyle/>
+          <a:p>
+            <a:r>
+              <a:rPr lang="en-US" dirty="0"/>
+              <a:t>New user? </a:t>
+            </a:r>
+            <a:r>
+              <a:rPr lang="en-US" u="sng" dirty="0"/>
+              <a:t>Register now</a:t>
+            </a:r>
+          </a:p>
+        </p:txBody>
+      </p:sp>
+      <p:grpSp>
+        <p:nvGrpSpPr>
+          <p:cNvPr id="26" name="Group 25">
+            <a:extLst>
+              <a:ext uri="{FF2B5EF4-FFF2-40B4-BE49-F238E27FC236}">
+                <a16:creationId xmlns:a16="http://schemas.microsoft.com/office/drawing/2014/main" id="{AFF324F8-3340-4BC0-98B7-76A5D5B07DBB}"/>
+              </a:ext>
+            </a:extLst>
+          </p:cNvPr>
+          <p:cNvGrpSpPr/>
+          <p:nvPr/>
+        </p:nvGrpSpPr>
+        <p:grpSpPr>
+          <a:xfrm>
+            <a:off x="0" y="-38624"/>
+            <a:ext cx="12192000" cy="2126744"/>
+            <a:chOff x="0" y="841258"/>
+            <a:chExt cx="12192000" cy="2126744"/>
+          </a:xfrm>
+        </p:grpSpPr>
+        <p:sp>
+          <p:nvSpPr>
+            <p:cNvPr id="27" name="Rectangle 26">
+              <a:extLst>
+                <a:ext uri="{FF2B5EF4-FFF2-40B4-BE49-F238E27FC236}">
+                  <a16:creationId xmlns:a16="http://schemas.microsoft.com/office/drawing/2014/main" id="{4C9496D6-FBBF-4E0B-898D-DABB3BBD623E}"/>
+                </a:ext>
+              </a:extLst>
+            </p:cNvPr>
+            <p:cNvSpPr/>
+            <p:nvPr/>
+          </p:nvSpPr>
+          <p:spPr>
+            <a:xfrm>
+              <a:off x="0" y="889161"/>
+              <a:ext cx="12192000" cy="1244893"/>
+            </a:xfrm>
+            <a:prstGeom prst="rect">
+              <a:avLst/>
+            </a:prstGeom>
+            <a:solidFill>
+              <a:srgbClr val="2256B4"/>
+            </a:solidFill>
+            <a:ln>
+              <a:noFill/>
+            </a:ln>
+          </p:spPr>
+          <p:style>
+            <a:lnRef idx="2">
+              <a:schemeClr val="accent1">
+                <a:shade val="50000"/>
+              </a:schemeClr>
+            </a:lnRef>
+            <a:fillRef idx="1">
+              <a:schemeClr val="accent1"/>
+            </a:fillRef>
+            <a:effectRef idx="0">
+              <a:schemeClr val="accent1"/>
+            </a:effectRef>
+            <a:fontRef idx="minor">
+              <a:schemeClr val="lt1"/>
+            </a:fontRef>
+          </p:style>
+          <p:txBody>
+            <a:bodyPr rtlCol="0" anchor="ctr"/>
+            <a:lstStyle/>
+            <a:p>
+              <a:pPr algn="ctr"/>
+              <a:endParaRPr lang="en-US"/>
+            </a:p>
+          </p:txBody>
+        </p:sp>
+        <p:sp>
+          <p:nvSpPr>
+            <p:cNvPr id="28" name="TextBox 27">
+              <a:extLst>
+                <a:ext uri="{FF2B5EF4-FFF2-40B4-BE49-F238E27FC236}">
+                  <a16:creationId xmlns:a16="http://schemas.microsoft.com/office/drawing/2014/main" id="{AE4E7E2C-8F0B-4675-8570-767699E5E810}"/>
+                </a:ext>
+              </a:extLst>
+            </p:cNvPr>
+            <p:cNvSpPr txBox="1"/>
+            <p:nvPr/>
+          </p:nvSpPr>
+          <p:spPr>
+            <a:xfrm>
+              <a:off x="4293660" y="1554528"/>
+              <a:ext cx="6558280" cy="584775"/>
+            </a:xfrm>
+            <a:prstGeom prst="rect">
+              <a:avLst/>
+            </a:prstGeom>
+            <a:noFill/>
+          </p:spPr>
+          <p:txBody>
+            <a:bodyPr wrap="square" rtlCol="0">
+              <a:spAutoFit/>
+            </a:bodyPr>
+            <a:lstStyle/>
+            <a:p>
+              <a:r>
+                <a:rPr lang="en-US" sz="3200" dirty="0">
+                  <a:solidFill>
+                    <a:schemeClr val="bg1"/>
+                  </a:solidFill>
+                </a:rPr>
+                <a:t>Buy and Recycle Paper</a:t>
+              </a:r>
+            </a:p>
+          </p:txBody>
+        </p:sp>
+        <p:grpSp>
+          <p:nvGrpSpPr>
+            <p:cNvPr id="29" name="Group 28">
+              <a:extLst>
+                <a:ext uri="{FF2B5EF4-FFF2-40B4-BE49-F238E27FC236}">
+                  <a16:creationId xmlns:a16="http://schemas.microsoft.com/office/drawing/2014/main" id="{D8D1F6F9-4F05-4093-9157-DF6061E1B1CE}"/>
+                </a:ext>
+              </a:extLst>
+            </p:cNvPr>
+            <p:cNvGrpSpPr/>
+            <p:nvPr/>
+          </p:nvGrpSpPr>
+          <p:grpSpPr>
+            <a:xfrm>
+              <a:off x="1161336" y="841258"/>
+              <a:ext cx="2764026" cy="2126744"/>
+              <a:chOff x="1340060" y="1409482"/>
+              <a:chExt cx="2150450" cy="1534225"/>
+            </a:xfrm>
+          </p:grpSpPr>
+          <p:pic>
+            <p:nvPicPr>
+              <p:cNvPr id="30" name="Picture 29">
+                <a:extLst>
+                  <a:ext uri="{FF2B5EF4-FFF2-40B4-BE49-F238E27FC236}">
+                    <a16:creationId xmlns:a16="http://schemas.microsoft.com/office/drawing/2014/main" id="{B0ED9772-255D-48AB-A00E-68C246D48CBD}"/>
+                  </a:ext>
+                </a:extLst>
+              </p:cNvPr>
+              <p:cNvPicPr>
+                <a:picLocks noChangeAspect="1"/>
+              </p:cNvPicPr>
+              <p:nvPr/>
+            </p:nvPicPr>
+            <p:blipFill>
+              <a:blip r:embed="rId3">
+                <a:extLst>
+                  <a:ext uri="{28A0092B-C50C-407E-A947-70E740481C1C}">
+                    <a14:useLocalDpi xmlns:a14="http://schemas.microsoft.com/office/drawing/2010/main" val="0"/>
+                  </a:ext>
+                  <a:ext uri="{837473B0-CC2E-450A-ABE3-18F120FF3D39}">
+                    <a1611:picAttrSrcUrl xmlns:a1611="http://schemas.microsoft.com/office/drawing/2016/11/main" r:id="rId4"/>
+                  </a:ext>
+                </a:extLst>
+              </a:blip>
+              <a:stretch>
+                <a:fillRect/>
+              </a:stretch>
+            </p:blipFill>
+            <p:spPr>
+              <a:xfrm>
+                <a:off x="1340060" y="1409482"/>
+                <a:ext cx="1026789" cy="1026789"/>
+              </a:xfrm>
+              <a:prstGeom prst="rect">
+                <a:avLst/>
+              </a:prstGeom>
+            </p:spPr>
+          </p:pic>
+          <p:pic>
+            <p:nvPicPr>
+              <p:cNvPr id="31" name="Picture 30">
+                <a:extLst>
+                  <a:ext uri="{FF2B5EF4-FFF2-40B4-BE49-F238E27FC236}">
+                    <a16:creationId xmlns:a16="http://schemas.microsoft.com/office/drawing/2014/main" id="{EA939A43-A5CD-4A98-9867-30D91AF01314}"/>
+                  </a:ext>
+                </a:extLst>
+              </p:cNvPr>
+              <p:cNvPicPr>
+                <a:picLocks noChangeAspect="1"/>
+              </p:cNvPicPr>
+              <p:nvPr/>
+            </p:nvPicPr>
+            <p:blipFill>
+              <a:blip r:embed="rId5">
+                <a:alphaModFix/>
+                <a:lum bright="70000" contrast="-70000"/>
+                <a:extLst>
+                  <a:ext uri="{BEBA8EAE-BF5A-486C-A8C5-ECC9F3942E4B}">
+                    <a14:imgProps xmlns:a14="http://schemas.microsoft.com/office/drawing/2010/main">
+                      <a14:imgLayer r:embed="rId6">
+                        <a14:imgEffect>
+                          <a14:colorTemperature colorTemp="11200"/>
+                        </a14:imgEffect>
+                        <a14:imgEffect>
+                          <a14:brightnessContrast bright="40000" contrast="20000"/>
+                        </a14:imgEffect>
+                      </a14:imgLayer>
+                    </a14:imgProps>
+                  </a:ext>
+                  <a:ext uri="{28A0092B-C50C-407E-A947-70E740481C1C}">
+                    <a14:useLocalDpi xmlns:a14="http://schemas.microsoft.com/office/drawing/2010/main" val="0"/>
+                  </a:ext>
+                  <a:ext uri="{837473B0-CC2E-450A-ABE3-18F120FF3D39}">
+                    <a1611:picAttrSrcUrl xmlns:a1611="http://schemas.microsoft.com/office/drawing/2016/11/main" r:id="rId7"/>
+                  </a:ext>
+                </a:extLst>
+              </a:blip>
+              <a:stretch>
+                <a:fillRect/>
+              </a:stretch>
+            </p:blipFill>
+            <p:spPr>
+              <a:xfrm>
+                <a:off x="2109690" y="1459400"/>
+                <a:ext cx="1380820" cy="1380820"/>
+              </a:xfrm>
+              <a:prstGeom prst="rect">
+                <a:avLst/>
+              </a:prstGeom>
+              <a:ln>
+                <a:noFill/>
+              </a:ln>
+            </p:spPr>
+          </p:pic>
+          <p:pic>
+            <p:nvPicPr>
+              <p:cNvPr id="32" name="Picture 31">
+                <a:extLst>
+                  <a:ext uri="{FF2B5EF4-FFF2-40B4-BE49-F238E27FC236}">
+                    <a16:creationId xmlns:a16="http://schemas.microsoft.com/office/drawing/2014/main" id="{BE425603-7EEE-469A-A45D-A278FF67574B}"/>
+                  </a:ext>
+                </a:extLst>
+              </p:cNvPr>
+              <p:cNvPicPr>
+                <a:picLocks noChangeAspect="1"/>
+              </p:cNvPicPr>
+              <p:nvPr/>
+            </p:nvPicPr>
+            <p:blipFill>
+              <a:blip r:embed="rId5">
+                <a:alphaModFix/>
+                <a:duotone>
+                  <a:schemeClr val="accent1">
+                    <a:shade val="45000"/>
+                    <a:satMod val="135000"/>
+                  </a:schemeClr>
+                  <a:prstClr val="white"/>
+                </a:duotone>
+                <a:extLst>
+                  <a:ext uri="{BEBA8EAE-BF5A-486C-A8C5-ECC9F3942E4B}">
+                    <a14:imgProps xmlns:a14="http://schemas.microsoft.com/office/drawing/2010/main">
+                      <a14:imgLayer r:embed="rId6">
+                        <a14:imgEffect>
+                          <a14:colorTemperature colorTemp="11200"/>
+                        </a14:imgEffect>
+                        <a14:imgEffect>
+                          <a14:brightnessContrast bright="40000" contrast="20000"/>
+                        </a14:imgEffect>
+                      </a14:imgLayer>
+                    </a14:imgProps>
+                  </a:ext>
+                  <a:ext uri="{28A0092B-C50C-407E-A947-70E740481C1C}">
+                    <a14:useLocalDpi xmlns:a14="http://schemas.microsoft.com/office/drawing/2010/main" val="0"/>
+                  </a:ext>
+                  <a:ext uri="{837473B0-CC2E-450A-ABE3-18F120FF3D39}">
+                    <a1611:picAttrSrcUrl xmlns:a1611="http://schemas.microsoft.com/office/drawing/2016/11/main" r:id="rId7"/>
+                  </a:ext>
+                </a:extLst>
+              </a:blip>
+              <a:stretch>
+                <a:fillRect/>
+              </a:stretch>
+            </p:blipFill>
+            <p:spPr>
+              <a:xfrm>
+                <a:off x="2085009" y="1562887"/>
+                <a:ext cx="1380820" cy="1380820"/>
+              </a:xfrm>
+              <a:prstGeom prst="rect">
+                <a:avLst/>
+              </a:prstGeom>
+              <a:ln>
+                <a:noFill/>
+              </a:ln>
+            </p:spPr>
+          </p:pic>
+        </p:grpSp>
+      </p:grpSp>
+      <p:sp>
+        <p:nvSpPr>
+          <p:cNvPr id="15" name="TextBox 14">
+            <a:extLst>
+              <a:ext uri="{FF2B5EF4-FFF2-40B4-BE49-F238E27FC236}">
+                <a16:creationId xmlns:a16="http://schemas.microsoft.com/office/drawing/2014/main" id="{56D8F51E-4460-4F1E-90BA-942FBE4DF6DF}"/>
+              </a:ext>
+            </a:extLst>
+          </p:cNvPr>
+          <p:cNvSpPr txBox="1"/>
+          <p:nvPr/>
+        </p:nvSpPr>
+        <p:spPr>
+          <a:xfrm>
+            <a:off x="3181820" y="2758865"/>
+            <a:ext cx="600363" cy="369332"/>
+          </a:xfrm>
+          <a:prstGeom prst="rect">
+            <a:avLst/>
+          </a:prstGeom>
+          <a:noFill/>
+        </p:spPr>
+        <p:txBody>
+          <a:bodyPr wrap="square" rtlCol="0">
+            <a:spAutoFit/>
+          </a:bodyPr>
+          <a:lstStyle/>
+          <a:p>
+            <a:r>
+              <a:rPr lang="en-US" dirty="0"/>
+              <a:t>*</a:t>
+            </a:r>
+          </a:p>
+        </p:txBody>
+      </p:sp>
+      <p:sp>
+        <p:nvSpPr>
+          <p:cNvPr id="23" name="TextBox 22">
+            <a:extLst>
+              <a:ext uri="{FF2B5EF4-FFF2-40B4-BE49-F238E27FC236}">
+                <a16:creationId xmlns:a16="http://schemas.microsoft.com/office/drawing/2014/main" id="{30DD702A-9D38-4C6F-AF9E-4EEF02F5A107}"/>
+              </a:ext>
+            </a:extLst>
+          </p:cNvPr>
+          <p:cNvSpPr txBox="1"/>
+          <p:nvPr/>
+        </p:nvSpPr>
+        <p:spPr>
+          <a:xfrm>
+            <a:off x="3181820" y="3592565"/>
+            <a:ext cx="600363" cy="369332"/>
+          </a:xfrm>
+          <a:prstGeom prst="rect">
+            <a:avLst/>
+          </a:prstGeom>
+          <a:noFill/>
+        </p:spPr>
+        <p:txBody>
+          <a:bodyPr wrap="square" rtlCol="0">
+            <a:spAutoFit/>
+          </a:bodyPr>
+          <a:lstStyle/>
+          <a:p>
+            <a:r>
+              <a:rPr lang="en-US" dirty="0"/>
+              <a:t>*</a:t>
             </a:r>
           </a:p>
         </p:txBody>
@@ -5160,7 +5385,7 @@
     </p:spTree>
     <p:extLst>
       <p:ext uri="{BB962C8B-B14F-4D97-AF65-F5344CB8AC3E}">
-        <p14:creationId xmlns:p14="http://schemas.microsoft.com/office/powerpoint/2010/main" val="3785865091"/>
+        <p14:creationId xmlns:p14="http://schemas.microsoft.com/office/powerpoint/2010/main" val="2647149883"/>
       </p:ext>
     </p:extLst>
   </p:cSld>
@@ -5322,10 +5547,10 @@
       </p:cxnSp>
       <p:cxnSp>
         <p:nvCxnSpPr>
-          <p:cNvPr id="16" name="Straight Connector 15">
-            <a:extLst>
-              <a:ext uri="{FF2B5EF4-FFF2-40B4-BE49-F238E27FC236}">
-                <a16:creationId xmlns:a16="http://schemas.microsoft.com/office/drawing/2014/main" id="{EB5D56B5-FE00-4873-8858-5D6DE5BB5B44}"/>
+          <p:cNvPr id="17" name="Straight Connector 16">
+            <a:extLst>
+              <a:ext uri="{FF2B5EF4-FFF2-40B4-BE49-F238E27FC236}">
+                <a16:creationId xmlns:a16="http://schemas.microsoft.com/office/drawing/2014/main" id="{10C5BD50-390E-4208-B1E6-1AA61F8840FC}"/>
               </a:ext>
             </a:extLst>
           </p:cNvPr>
@@ -5336,52 +5561,7 @@
         </p:nvCxnSpPr>
         <p:spPr>
           <a:xfrm>
-            <a:off x="0" y="2981606"/>
-            <a:ext cx="2331090" cy="0"/>
-          </a:xfrm>
-          <a:prstGeom prst="line">
-            <a:avLst/>
-          </a:prstGeom>
-          <a:ln w="34925">
-            <a:solidFill>
-              <a:schemeClr val="bg1">
-                <a:lumMod val="85000"/>
-              </a:schemeClr>
-            </a:solidFill>
-          </a:ln>
-        </p:spPr>
-        <p:style>
-          <a:lnRef idx="1">
-            <a:schemeClr val="accent1"/>
-          </a:lnRef>
-          <a:fillRef idx="0">
-            <a:schemeClr val="accent1"/>
-          </a:fillRef>
-          <a:effectRef idx="0">
-            <a:schemeClr val="accent1"/>
-          </a:effectRef>
-          <a:fontRef idx="minor">
-            <a:schemeClr val="tx1"/>
-          </a:fontRef>
-        </p:style>
-      </p:cxnSp>
-      <p:cxnSp>
-        <p:nvCxnSpPr>
-          <p:cNvPr id="17" name="Straight Connector 16">
-            <a:extLst>
-              <a:ext uri="{FF2B5EF4-FFF2-40B4-BE49-F238E27FC236}">
-                <a16:creationId xmlns:a16="http://schemas.microsoft.com/office/drawing/2014/main" id="{10C5BD50-390E-4208-B1E6-1AA61F8840FC}"/>
-              </a:ext>
-            </a:extLst>
-          </p:cNvPr>
-          <p:cNvCxnSpPr>
-            <a:cxnSpLocks/>
-          </p:cNvCxnSpPr>
-          <p:nvPr/>
-        </p:nvCxnSpPr>
-        <p:spPr>
-          <a:xfrm>
-            <a:off x="3495" y="3718623"/>
+            <a:off x="3495" y="3007423"/>
             <a:ext cx="2331090" cy="0"/>
           </a:xfrm>
           <a:prstGeom prst="line">
@@ -5426,7 +5606,7 @@
         </p:nvCxnSpPr>
         <p:spPr>
           <a:xfrm>
-            <a:off x="3495" y="4395679"/>
+            <a:off x="3495" y="3684479"/>
             <a:ext cx="2331090" cy="0"/>
           </a:xfrm>
           <a:prstGeom prst="line">
@@ -5457,10 +5637,10 @@
       </p:cxnSp>
       <p:sp>
         <p:nvSpPr>
-          <p:cNvPr id="21" name="TextBox 20">
-            <a:extLst>
-              <a:ext uri="{FF2B5EF4-FFF2-40B4-BE49-F238E27FC236}">
-                <a16:creationId xmlns:a16="http://schemas.microsoft.com/office/drawing/2014/main" id="{3419BB92-B2CF-41F7-8017-A837F9C8097D}"/>
+          <p:cNvPr id="22" name="TextBox 21">
+            <a:extLst>
+              <a:ext uri="{FF2B5EF4-FFF2-40B4-BE49-F238E27FC236}">
+                <a16:creationId xmlns:a16="http://schemas.microsoft.com/office/drawing/2014/main" id="{B302F7A3-88BD-4D80-A496-DF25467EF2C5}"/>
               </a:ext>
             </a:extLst>
           </p:cNvPr>
@@ -5469,48 +5649,7 @@
         </p:nvSpPr>
         <p:spPr>
           <a:xfrm>
-            <a:off x="184316" y="2486848"/>
-            <a:ext cx="1655906" cy="400110"/>
-          </a:xfrm>
-          <a:prstGeom prst="rect">
-            <a:avLst/>
-          </a:prstGeom>
-          <a:noFill/>
-        </p:spPr>
-        <p:txBody>
-          <a:bodyPr wrap="square" rtlCol="0">
-            <a:spAutoFit/>
-          </a:bodyPr>
-          <a:lstStyle/>
-          <a:p>
-            <a:r>
-              <a:rPr lang="en-US" sz="2000" dirty="0">
-                <a:solidFill>
-                  <a:schemeClr val="bg1">
-                    <a:lumMod val="65000"/>
-                  </a:schemeClr>
-                </a:solidFill>
-              </a:rPr>
-              <a:t>Reward Points</a:t>
-            </a:r>
-          </a:p>
-        </p:txBody>
-      </p:sp>
-      <p:sp>
-        <p:nvSpPr>
-          <p:cNvPr id="22" name="TextBox 21">
-            <a:extLst>
-              <a:ext uri="{FF2B5EF4-FFF2-40B4-BE49-F238E27FC236}">
-                <a16:creationId xmlns:a16="http://schemas.microsoft.com/office/drawing/2014/main" id="{B302F7A3-88BD-4D80-A496-DF25467EF2C5}"/>
-              </a:ext>
-            </a:extLst>
-          </p:cNvPr>
-          <p:cNvSpPr txBox="1"/>
-          <p:nvPr/>
-        </p:nvSpPr>
-        <p:spPr>
-          <a:xfrm>
-            <a:off x="184316" y="3170173"/>
+            <a:off x="184316" y="2458973"/>
             <a:ext cx="1655906" cy="400110"/>
           </a:xfrm>
           <a:prstGeom prst="rect">
@@ -5551,7 +5690,7 @@
         </p:nvSpPr>
         <p:spPr>
           <a:xfrm>
-            <a:off x="184316" y="3853498"/>
+            <a:off x="184316" y="3142298"/>
             <a:ext cx="1655906" cy="400110"/>
           </a:xfrm>
           <a:prstGeom prst="rect">
@@ -5648,7 +5787,7 @@
         </p:nvCxnSpPr>
         <p:spPr>
           <a:xfrm>
-            <a:off x="2" y="5059483"/>
+            <a:off x="2" y="4348283"/>
             <a:ext cx="2331090" cy="0"/>
           </a:xfrm>
           <a:prstGeom prst="line">
@@ -5691,7 +5830,7 @@
         </p:nvSpPr>
         <p:spPr>
           <a:xfrm>
-            <a:off x="184316" y="4536824"/>
+            <a:off x="184316" y="3825624"/>
             <a:ext cx="1655906" cy="400110"/>
           </a:xfrm>
           <a:prstGeom prst="rect">
@@ -6865,10 +7004,10 @@
       </p:cxnSp>
       <p:cxnSp>
         <p:nvCxnSpPr>
-          <p:cNvPr id="16" name="Straight Connector 15">
-            <a:extLst>
-              <a:ext uri="{FF2B5EF4-FFF2-40B4-BE49-F238E27FC236}">
-                <a16:creationId xmlns:a16="http://schemas.microsoft.com/office/drawing/2014/main" id="{EB5D56B5-FE00-4873-8858-5D6DE5BB5B44}"/>
+          <p:cNvPr id="17" name="Straight Connector 16">
+            <a:extLst>
+              <a:ext uri="{FF2B5EF4-FFF2-40B4-BE49-F238E27FC236}">
+                <a16:creationId xmlns:a16="http://schemas.microsoft.com/office/drawing/2014/main" id="{10C5BD50-390E-4208-B1E6-1AA61F8840FC}"/>
               </a:ext>
             </a:extLst>
           </p:cNvPr>
@@ -6879,52 +7018,7 @@
         </p:nvCxnSpPr>
         <p:spPr>
           <a:xfrm>
-            <a:off x="0" y="2981606"/>
-            <a:ext cx="2331090" cy="0"/>
-          </a:xfrm>
-          <a:prstGeom prst="line">
-            <a:avLst/>
-          </a:prstGeom>
-          <a:ln w="34925">
-            <a:solidFill>
-              <a:schemeClr val="bg1">
-                <a:lumMod val="85000"/>
-              </a:schemeClr>
-            </a:solidFill>
-          </a:ln>
-        </p:spPr>
-        <p:style>
-          <a:lnRef idx="1">
-            <a:schemeClr val="accent1"/>
-          </a:lnRef>
-          <a:fillRef idx="0">
-            <a:schemeClr val="accent1"/>
-          </a:fillRef>
-          <a:effectRef idx="0">
-            <a:schemeClr val="accent1"/>
-          </a:effectRef>
-          <a:fontRef idx="minor">
-            <a:schemeClr val="tx1"/>
-          </a:fontRef>
-        </p:style>
-      </p:cxnSp>
-      <p:cxnSp>
-        <p:nvCxnSpPr>
-          <p:cNvPr id="17" name="Straight Connector 16">
-            <a:extLst>
-              <a:ext uri="{FF2B5EF4-FFF2-40B4-BE49-F238E27FC236}">
-                <a16:creationId xmlns:a16="http://schemas.microsoft.com/office/drawing/2014/main" id="{10C5BD50-390E-4208-B1E6-1AA61F8840FC}"/>
-              </a:ext>
-            </a:extLst>
-          </p:cNvPr>
-          <p:cNvCxnSpPr>
-            <a:cxnSpLocks/>
-          </p:cNvCxnSpPr>
-          <p:nvPr/>
-        </p:nvCxnSpPr>
-        <p:spPr>
-          <a:xfrm>
-            <a:off x="3495" y="3718623"/>
+            <a:off x="3495" y="2997263"/>
             <a:ext cx="2331090" cy="0"/>
           </a:xfrm>
           <a:prstGeom prst="line">
@@ -6969,7 +7063,7 @@
         </p:nvCxnSpPr>
         <p:spPr>
           <a:xfrm>
-            <a:off x="3495" y="4395679"/>
+            <a:off x="3495" y="3674319"/>
             <a:ext cx="2331090" cy="0"/>
           </a:xfrm>
           <a:prstGeom prst="line">
@@ -7000,10 +7094,10 @@
       </p:cxnSp>
       <p:sp>
         <p:nvSpPr>
-          <p:cNvPr id="21" name="TextBox 20">
-            <a:extLst>
-              <a:ext uri="{FF2B5EF4-FFF2-40B4-BE49-F238E27FC236}">
-                <a16:creationId xmlns:a16="http://schemas.microsoft.com/office/drawing/2014/main" id="{3419BB92-B2CF-41F7-8017-A837F9C8097D}"/>
+          <p:cNvPr id="22" name="TextBox 21">
+            <a:extLst>
+              <a:ext uri="{FF2B5EF4-FFF2-40B4-BE49-F238E27FC236}">
+                <a16:creationId xmlns:a16="http://schemas.microsoft.com/office/drawing/2014/main" id="{B302F7A3-88BD-4D80-A496-DF25467EF2C5}"/>
               </a:ext>
             </a:extLst>
           </p:cNvPr>
@@ -7012,48 +7106,7 @@
         </p:nvSpPr>
         <p:spPr>
           <a:xfrm>
-            <a:off x="184316" y="2486848"/>
-            <a:ext cx="1655906" cy="400110"/>
-          </a:xfrm>
-          <a:prstGeom prst="rect">
-            <a:avLst/>
-          </a:prstGeom>
-          <a:noFill/>
-        </p:spPr>
-        <p:txBody>
-          <a:bodyPr wrap="square" rtlCol="0">
-            <a:spAutoFit/>
-          </a:bodyPr>
-          <a:lstStyle/>
-          <a:p>
-            <a:r>
-              <a:rPr lang="en-US" sz="2000" dirty="0">
-                <a:solidFill>
-                  <a:schemeClr val="bg1">
-                    <a:lumMod val="65000"/>
-                  </a:schemeClr>
-                </a:solidFill>
-              </a:rPr>
-              <a:t>Reward Points</a:t>
-            </a:r>
-          </a:p>
-        </p:txBody>
-      </p:sp>
-      <p:sp>
-        <p:nvSpPr>
-          <p:cNvPr id="22" name="TextBox 21">
-            <a:extLst>
-              <a:ext uri="{FF2B5EF4-FFF2-40B4-BE49-F238E27FC236}">
-                <a16:creationId xmlns:a16="http://schemas.microsoft.com/office/drawing/2014/main" id="{B302F7A3-88BD-4D80-A496-DF25467EF2C5}"/>
-              </a:ext>
-            </a:extLst>
-          </p:cNvPr>
-          <p:cNvSpPr txBox="1"/>
-          <p:nvPr/>
-        </p:nvSpPr>
-        <p:spPr>
-          <a:xfrm>
-            <a:off x="184316" y="3170173"/>
+            <a:off x="184316" y="2448813"/>
             <a:ext cx="1655906" cy="400110"/>
           </a:xfrm>
           <a:prstGeom prst="rect">
@@ -7094,7 +7147,7 @@
         </p:nvSpPr>
         <p:spPr>
           <a:xfrm>
-            <a:off x="184316" y="3853498"/>
+            <a:off x="184316" y="3132138"/>
             <a:ext cx="1655906" cy="400110"/>
           </a:xfrm>
           <a:prstGeom prst="rect">
@@ -7191,7 +7244,7 @@
         </p:nvCxnSpPr>
         <p:spPr>
           <a:xfrm>
-            <a:off x="2" y="5059483"/>
+            <a:off x="2" y="4338123"/>
             <a:ext cx="2331090" cy="0"/>
           </a:xfrm>
           <a:prstGeom prst="line">
@@ -7234,7 +7287,7 @@
         </p:nvSpPr>
         <p:spPr>
           <a:xfrm>
-            <a:off x="184316" y="4536824"/>
+            <a:off x="184316" y="3815464"/>
             <a:ext cx="1655906" cy="400110"/>
           </a:xfrm>
           <a:prstGeom prst="rect">
@@ -8532,10 +8585,10 @@
       </p:cxnSp>
       <p:cxnSp>
         <p:nvCxnSpPr>
-          <p:cNvPr id="16" name="Straight Connector 15">
-            <a:extLst>
-              <a:ext uri="{FF2B5EF4-FFF2-40B4-BE49-F238E27FC236}">
-                <a16:creationId xmlns:a16="http://schemas.microsoft.com/office/drawing/2014/main" id="{EB5D56B5-FE00-4873-8858-5D6DE5BB5B44}"/>
+          <p:cNvPr id="17" name="Straight Connector 16">
+            <a:extLst>
+              <a:ext uri="{FF2B5EF4-FFF2-40B4-BE49-F238E27FC236}">
+                <a16:creationId xmlns:a16="http://schemas.microsoft.com/office/drawing/2014/main" id="{10C5BD50-390E-4208-B1E6-1AA61F8840FC}"/>
               </a:ext>
             </a:extLst>
           </p:cNvPr>
@@ -8546,52 +8599,7 @@
         </p:nvCxnSpPr>
         <p:spPr>
           <a:xfrm>
-            <a:off x="0" y="2981606"/>
-            <a:ext cx="2331090" cy="0"/>
-          </a:xfrm>
-          <a:prstGeom prst="line">
-            <a:avLst/>
-          </a:prstGeom>
-          <a:ln w="34925">
-            <a:solidFill>
-              <a:schemeClr val="bg1">
-                <a:lumMod val="85000"/>
-              </a:schemeClr>
-            </a:solidFill>
-          </a:ln>
-        </p:spPr>
-        <p:style>
-          <a:lnRef idx="1">
-            <a:schemeClr val="accent1"/>
-          </a:lnRef>
-          <a:fillRef idx="0">
-            <a:schemeClr val="accent1"/>
-          </a:fillRef>
-          <a:effectRef idx="0">
-            <a:schemeClr val="accent1"/>
-          </a:effectRef>
-          <a:fontRef idx="minor">
-            <a:schemeClr val="tx1"/>
-          </a:fontRef>
-        </p:style>
-      </p:cxnSp>
-      <p:cxnSp>
-        <p:nvCxnSpPr>
-          <p:cNvPr id="17" name="Straight Connector 16">
-            <a:extLst>
-              <a:ext uri="{FF2B5EF4-FFF2-40B4-BE49-F238E27FC236}">
-                <a16:creationId xmlns:a16="http://schemas.microsoft.com/office/drawing/2014/main" id="{10C5BD50-390E-4208-B1E6-1AA61F8840FC}"/>
-              </a:ext>
-            </a:extLst>
-          </p:cNvPr>
-          <p:cNvCxnSpPr>
-            <a:cxnSpLocks/>
-          </p:cNvCxnSpPr>
-          <p:nvPr/>
-        </p:nvCxnSpPr>
-        <p:spPr>
-          <a:xfrm>
-            <a:off x="3495" y="3718623"/>
+            <a:off x="3495" y="3017583"/>
             <a:ext cx="2331090" cy="0"/>
           </a:xfrm>
           <a:prstGeom prst="line">
@@ -8636,7 +8644,7 @@
         </p:nvCxnSpPr>
         <p:spPr>
           <a:xfrm>
-            <a:off x="3495" y="4395679"/>
+            <a:off x="3495" y="3694639"/>
             <a:ext cx="2331090" cy="0"/>
           </a:xfrm>
           <a:prstGeom prst="line">
@@ -8667,10 +8675,10 @@
       </p:cxnSp>
       <p:sp>
         <p:nvSpPr>
-          <p:cNvPr id="21" name="TextBox 20">
-            <a:extLst>
-              <a:ext uri="{FF2B5EF4-FFF2-40B4-BE49-F238E27FC236}">
-                <a16:creationId xmlns:a16="http://schemas.microsoft.com/office/drawing/2014/main" id="{3419BB92-B2CF-41F7-8017-A837F9C8097D}"/>
+          <p:cNvPr id="22" name="TextBox 21">
+            <a:extLst>
+              <a:ext uri="{FF2B5EF4-FFF2-40B4-BE49-F238E27FC236}">
+                <a16:creationId xmlns:a16="http://schemas.microsoft.com/office/drawing/2014/main" id="{B302F7A3-88BD-4D80-A496-DF25467EF2C5}"/>
               </a:ext>
             </a:extLst>
           </p:cNvPr>
@@ -8679,48 +8687,7 @@
         </p:nvSpPr>
         <p:spPr>
           <a:xfrm>
-            <a:off x="184316" y="2486848"/>
-            <a:ext cx="1655906" cy="400110"/>
-          </a:xfrm>
-          <a:prstGeom prst="rect">
-            <a:avLst/>
-          </a:prstGeom>
-          <a:noFill/>
-        </p:spPr>
-        <p:txBody>
-          <a:bodyPr wrap="square" rtlCol="0">
-            <a:spAutoFit/>
-          </a:bodyPr>
-          <a:lstStyle/>
-          <a:p>
-            <a:r>
-              <a:rPr lang="en-US" sz="2000" dirty="0">
-                <a:solidFill>
-                  <a:schemeClr val="bg1">
-                    <a:lumMod val="65000"/>
-                  </a:schemeClr>
-                </a:solidFill>
-              </a:rPr>
-              <a:t>Reward Points</a:t>
-            </a:r>
-          </a:p>
-        </p:txBody>
-      </p:sp>
-      <p:sp>
-        <p:nvSpPr>
-          <p:cNvPr id="22" name="TextBox 21">
-            <a:extLst>
-              <a:ext uri="{FF2B5EF4-FFF2-40B4-BE49-F238E27FC236}">
-                <a16:creationId xmlns:a16="http://schemas.microsoft.com/office/drawing/2014/main" id="{B302F7A3-88BD-4D80-A496-DF25467EF2C5}"/>
-              </a:ext>
-            </a:extLst>
-          </p:cNvPr>
-          <p:cNvSpPr txBox="1"/>
-          <p:nvPr/>
-        </p:nvSpPr>
-        <p:spPr>
-          <a:xfrm>
-            <a:off x="184316" y="3170173"/>
+            <a:off x="184316" y="2469133"/>
             <a:ext cx="1655906" cy="400110"/>
           </a:xfrm>
           <a:prstGeom prst="rect">
@@ -8761,7 +8728,7 @@
         </p:nvSpPr>
         <p:spPr>
           <a:xfrm>
-            <a:off x="184316" y="3853498"/>
+            <a:off x="184316" y="3152458"/>
             <a:ext cx="1655906" cy="400110"/>
           </a:xfrm>
           <a:prstGeom prst="rect">
@@ -8788,60 +8755,6 @@
           </a:p>
         </p:txBody>
       </p:sp>
-      <p:sp>
-        <p:nvSpPr>
-          <p:cNvPr id="24" name="Arrow: Pentagon 23">
-            <a:extLst>
-              <a:ext uri="{FF2B5EF4-FFF2-40B4-BE49-F238E27FC236}">
-                <a16:creationId xmlns:a16="http://schemas.microsoft.com/office/drawing/2014/main" id="{DA733D7C-A8E8-4720-8261-20A9F32E0682}"/>
-              </a:ext>
-            </a:extLst>
-          </p:cNvPr>
-          <p:cNvSpPr/>
-          <p:nvPr/>
-        </p:nvSpPr>
-        <p:spPr>
-          <a:xfrm>
-            <a:off x="0" y="1637692"/>
-            <a:ext cx="2666921" cy="666859"/>
-          </a:xfrm>
-          <a:prstGeom prst="homePlate">
-            <a:avLst/>
-          </a:prstGeom>
-          <a:solidFill>
-            <a:srgbClr val="1D4999"/>
-          </a:solidFill>
-          <a:ln w="28575">
-            <a:solidFill>
-              <a:srgbClr val="D9D9D9"/>
-            </a:solidFill>
-          </a:ln>
-        </p:spPr>
-        <p:style>
-          <a:lnRef idx="2">
-            <a:schemeClr val="accent1">
-              <a:shade val="50000"/>
-            </a:schemeClr>
-          </a:lnRef>
-          <a:fillRef idx="1">
-            <a:schemeClr val="accent1"/>
-          </a:fillRef>
-          <a:effectRef idx="0">
-            <a:schemeClr val="accent1"/>
-          </a:effectRef>
-          <a:fontRef idx="minor">
-            <a:schemeClr val="lt1"/>
-          </a:fontRef>
-        </p:style>
-        <p:txBody>
-          <a:bodyPr rtlCol="0" anchor="ctr"/>
-          <a:lstStyle/>
-          <a:p>
-            <a:pPr algn="ctr"/>
-            <a:endParaRPr lang="en-US"/>
-          </a:p>
-        </p:txBody>
-      </p:sp>
       <p:cxnSp>
         <p:nvCxnSpPr>
           <p:cNvPr id="31" name="Straight Connector 30">
@@ -8858,7 +8771,7 @@
         </p:nvCxnSpPr>
         <p:spPr>
           <a:xfrm>
-            <a:off x="2" y="5059483"/>
+            <a:off x="2" y="4358443"/>
             <a:ext cx="2331090" cy="0"/>
           </a:xfrm>
           <a:prstGeom prst="line">
@@ -8901,7 +8814,7 @@
         </p:nvSpPr>
         <p:spPr>
           <a:xfrm>
-            <a:off x="184316" y="4536824"/>
+            <a:off x="184316" y="3835784"/>
             <a:ext cx="1655906" cy="400110"/>
           </a:xfrm>
           <a:prstGeom prst="rect">
@@ -8928,45 +8841,120 @@
           </a:p>
         </p:txBody>
       </p:sp>
-      <p:sp>
-        <p:nvSpPr>
-          <p:cNvPr id="33" name="TextBox 32">
-            <a:extLst>
-              <a:ext uri="{FF2B5EF4-FFF2-40B4-BE49-F238E27FC236}">
-                <a16:creationId xmlns:a16="http://schemas.microsoft.com/office/drawing/2014/main" id="{22E731A1-EEC5-4FAE-A378-7839EE9FB662}"/>
-              </a:ext>
-            </a:extLst>
-          </p:cNvPr>
-          <p:cNvSpPr txBox="1"/>
-          <p:nvPr/>
-        </p:nvSpPr>
-        <p:spPr>
-          <a:xfrm>
-            <a:off x="184316" y="1741968"/>
-            <a:ext cx="1655906" cy="461665"/>
-          </a:xfrm>
-          <a:prstGeom prst="rect">
-            <a:avLst/>
-          </a:prstGeom>
-          <a:noFill/>
-        </p:spPr>
-        <p:txBody>
-          <a:bodyPr wrap="square" rtlCol="0">
-            <a:spAutoFit/>
-          </a:bodyPr>
-          <a:lstStyle/>
-          <a:p>
-            <a:r>
-              <a:rPr lang="en-US" sz="2400" dirty="0">
-                <a:solidFill>
-                  <a:schemeClr val="bg1"/>
-                </a:solidFill>
-              </a:rPr>
-              <a:t>Buy Paper</a:t>
-            </a:r>
-          </a:p>
-        </p:txBody>
-      </p:sp>
+      <p:grpSp>
+        <p:nvGrpSpPr>
+          <p:cNvPr id="4" name="Group 3">
+            <a:extLst>
+              <a:ext uri="{FF2B5EF4-FFF2-40B4-BE49-F238E27FC236}">
+                <a16:creationId xmlns:a16="http://schemas.microsoft.com/office/drawing/2014/main" id="{4BB50132-0B59-4183-8779-711A994E6450}"/>
+              </a:ext>
+            </a:extLst>
+          </p:cNvPr>
+          <p:cNvGrpSpPr/>
+          <p:nvPr/>
+        </p:nvGrpSpPr>
+        <p:grpSpPr>
+          <a:xfrm>
+            <a:off x="0" y="1637692"/>
+            <a:ext cx="2666921" cy="666859"/>
+            <a:chOff x="0" y="1637692"/>
+            <a:chExt cx="2666921" cy="666859"/>
+          </a:xfrm>
+        </p:grpSpPr>
+        <p:sp>
+          <p:nvSpPr>
+            <p:cNvPr id="24" name="Arrow: Pentagon 23">
+              <a:extLst>
+                <a:ext uri="{FF2B5EF4-FFF2-40B4-BE49-F238E27FC236}">
+                  <a16:creationId xmlns:a16="http://schemas.microsoft.com/office/drawing/2014/main" id="{DA733D7C-A8E8-4720-8261-20A9F32E0682}"/>
+                </a:ext>
+              </a:extLst>
+            </p:cNvPr>
+            <p:cNvSpPr/>
+            <p:nvPr/>
+          </p:nvSpPr>
+          <p:spPr>
+            <a:xfrm>
+              <a:off x="0" y="1637692"/>
+              <a:ext cx="2666921" cy="666859"/>
+            </a:xfrm>
+            <a:prstGeom prst="homePlate">
+              <a:avLst/>
+            </a:prstGeom>
+            <a:solidFill>
+              <a:srgbClr val="1D4999"/>
+            </a:solidFill>
+            <a:ln w="28575">
+              <a:solidFill>
+                <a:srgbClr val="D9D9D9"/>
+              </a:solidFill>
+            </a:ln>
+          </p:spPr>
+          <p:style>
+            <a:lnRef idx="2">
+              <a:schemeClr val="accent1">
+                <a:shade val="50000"/>
+              </a:schemeClr>
+            </a:lnRef>
+            <a:fillRef idx="1">
+              <a:schemeClr val="accent1"/>
+            </a:fillRef>
+            <a:effectRef idx="0">
+              <a:schemeClr val="accent1"/>
+            </a:effectRef>
+            <a:fontRef idx="minor">
+              <a:schemeClr val="lt1"/>
+            </a:fontRef>
+          </p:style>
+          <p:txBody>
+            <a:bodyPr rtlCol="0" anchor="ctr"/>
+            <a:lstStyle/>
+            <a:p>
+              <a:pPr algn="ctr"/>
+              <a:endParaRPr lang="en-US"/>
+            </a:p>
+          </p:txBody>
+        </p:sp>
+        <p:sp>
+          <p:nvSpPr>
+            <p:cNvPr id="33" name="TextBox 32">
+              <a:extLst>
+                <a:ext uri="{FF2B5EF4-FFF2-40B4-BE49-F238E27FC236}">
+                  <a16:creationId xmlns:a16="http://schemas.microsoft.com/office/drawing/2014/main" id="{22E731A1-EEC5-4FAE-A378-7839EE9FB662}"/>
+                </a:ext>
+              </a:extLst>
+            </p:cNvPr>
+            <p:cNvSpPr txBox="1"/>
+            <p:nvPr/>
+          </p:nvSpPr>
+          <p:spPr>
+            <a:xfrm>
+              <a:off x="184316" y="1741968"/>
+              <a:ext cx="1655906" cy="461665"/>
+            </a:xfrm>
+            <a:prstGeom prst="rect">
+              <a:avLst/>
+            </a:prstGeom>
+            <a:noFill/>
+          </p:spPr>
+          <p:txBody>
+            <a:bodyPr wrap="square" rtlCol="0">
+              <a:spAutoFit/>
+            </a:bodyPr>
+            <a:lstStyle/>
+            <a:p>
+              <a:r>
+                <a:rPr lang="en-US" sz="2400" dirty="0">
+                  <a:solidFill>
+                    <a:schemeClr val="bg1"/>
+                  </a:solidFill>
+                </a:rPr>
+                <a:t>Buy Paper</a:t>
+              </a:r>
+            </a:p>
+          </p:txBody>
+        </p:sp>
+      </p:grpSp>
       <p:sp>
         <p:nvSpPr>
           <p:cNvPr id="37" name="Rectangle 36">
@@ -11751,10 +11739,80 @@
           </p:pic>
         </p:grpSp>
       </p:grpSp>
+      <p:sp>
+        <p:nvSpPr>
+          <p:cNvPr id="15" name="TextBox 14">
+            <a:extLst>
+              <a:ext uri="{FF2B5EF4-FFF2-40B4-BE49-F238E27FC236}">
+                <a16:creationId xmlns:a16="http://schemas.microsoft.com/office/drawing/2014/main" id="{56D8F51E-4460-4F1E-90BA-942FBE4DF6DF}"/>
+              </a:ext>
+            </a:extLst>
+          </p:cNvPr>
+          <p:cNvSpPr txBox="1"/>
+          <p:nvPr/>
+        </p:nvSpPr>
+        <p:spPr>
+          <a:xfrm>
+            <a:off x="3181820" y="2758865"/>
+            <a:ext cx="600363" cy="369332"/>
+          </a:xfrm>
+          <a:prstGeom prst="rect">
+            <a:avLst/>
+          </a:prstGeom>
+          <a:noFill/>
+        </p:spPr>
+        <p:txBody>
+          <a:bodyPr wrap="square" rtlCol="0">
+            <a:spAutoFit/>
+          </a:bodyPr>
+          <a:lstStyle/>
+          <a:p>
+            <a:r>
+              <a:rPr lang="en-US" dirty="0"/>
+              <a:t>*</a:t>
+            </a:r>
+          </a:p>
+        </p:txBody>
+      </p:sp>
+      <p:sp>
+        <p:nvSpPr>
+          <p:cNvPr id="23" name="TextBox 22">
+            <a:extLst>
+              <a:ext uri="{FF2B5EF4-FFF2-40B4-BE49-F238E27FC236}">
+                <a16:creationId xmlns:a16="http://schemas.microsoft.com/office/drawing/2014/main" id="{30DD702A-9D38-4C6F-AF9E-4EEF02F5A107}"/>
+              </a:ext>
+            </a:extLst>
+          </p:cNvPr>
+          <p:cNvSpPr txBox="1"/>
+          <p:nvPr/>
+        </p:nvSpPr>
+        <p:spPr>
+          <a:xfrm>
+            <a:off x="3181820" y="3592565"/>
+            <a:ext cx="600363" cy="369332"/>
+          </a:xfrm>
+          <a:prstGeom prst="rect">
+            <a:avLst/>
+          </a:prstGeom>
+          <a:noFill/>
+        </p:spPr>
+        <p:txBody>
+          <a:bodyPr wrap="square" rtlCol="0">
+            <a:spAutoFit/>
+          </a:bodyPr>
+          <a:lstStyle/>
+          <a:p>
+            <a:r>
+              <a:rPr lang="en-US" dirty="0"/>
+              <a:t>*</a:t>
+            </a:r>
+          </a:p>
+        </p:txBody>
+      </p:sp>
     </p:spTree>
     <p:extLst>
       <p:ext uri="{BB962C8B-B14F-4D97-AF65-F5344CB8AC3E}">
-        <p14:creationId xmlns:p14="http://schemas.microsoft.com/office/powerpoint/2010/main" val="2647149883"/>
+        <p14:creationId xmlns:p14="http://schemas.microsoft.com/office/powerpoint/2010/main" val="3982121793"/>
       </p:ext>
     </p:extLst>
   </p:cSld>
@@ -11916,10 +11974,10 @@
       </p:cxnSp>
       <p:cxnSp>
         <p:nvCxnSpPr>
-          <p:cNvPr id="16" name="Straight Connector 15">
-            <a:extLst>
-              <a:ext uri="{FF2B5EF4-FFF2-40B4-BE49-F238E27FC236}">
-                <a16:creationId xmlns:a16="http://schemas.microsoft.com/office/drawing/2014/main" id="{EB5D56B5-FE00-4873-8858-5D6DE5BB5B44}"/>
+          <p:cNvPr id="17" name="Straight Connector 16">
+            <a:extLst>
+              <a:ext uri="{FF2B5EF4-FFF2-40B4-BE49-F238E27FC236}">
+                <a16:creationId xmlns:a16="http://schemas.microsoft.com/office/drawing/2014/main" id="{10C5BD50-390E-4208-B1E6-1AA61F8840FC}"/>
               </a:ext>
             </a:extLst>
           </p:cNvPr>
@@ -11930,52 +11988,7 @@
         </p:nvCxnSpPr>
         <p:spPr>
           <a:xfrm>
-            <a:off x="0" y="2981606"/>
-            <a:ext cx="2331090" cy="0"/>
-          </a:xfrm>
-          <a:prstGeom prst="line">
-            <a:avLst/>
-          </a:prstGeom>
-          <a:ln w="34925">
-            <a:solidFill>
-              <a:schemeClr val="bg1">
-                <a:lumMod val="85000"/>
-              </a:schemeClr>
-            </a:solidFill>
-          </a:ln>
-        </p:spPr>
-        <p:style>
-          <a:lnRef idx="1">
-            <a:schemeClr val="accent1"/>
-          </a:lnRef>
-          <a:fillRef idx="0">
-            <a:schemeClr val="accent1"/>
-          </a:fillRef>
-          <a:effectRef idx="0">
-            <a:schemeClr val="accent1"/>
-          </a:effectRef>
-          <a:fontRef idx="minor">
-            <a:schemeClr val="tx1"/>
-          </a:fontRef>
-        </p:style>
-      </p:cxnSp>
-      <p:cxnSp>
-        <p:nvCxnSpPr>
-          <p:cNvPr id="17" name="Straight Connector 16">
-            <a:extLst>
-              <a:ext uri="{FF2B5EF4-FFF2-40B4-BE49-F238E27FC236}">
-                <a16:creationId xmlns:a16="http://schemas.microsoft.com/office/drawing/2014/main" id="{10C5BD50-390E-4208-B1E6-1AA61F8840FC}"/>
-              </a:ext>
-            </a:extLst>
-          </p:cNvPr>
-          <p:cNvCxnSpPr>
-            <a:cxnSpLocks/>
-          </p:cNvCxnSpPr>
-          <p:nvPr/>
-        </p:nvCxnSpPr>
-        <p:spPr>
-          <a:xfrm>
-            <a:off x="3495" y="3718623"/>
+            <a:off x="0" y="3007254"/>
             <a:ext cx="2331090" cy="0"/>
           </a:xfrm>
           <a:prstGeom prst="line">
@@ -12020,7 +12033,7 @@
         </p:nvCxnSpPr>
         <p:spPr>
           <a:xfrm>
-            <a:off x="3495" y="4395679"/>
+            <a:off x="-13891" y="3755995"/>
             <a:ext cx="2331090" cy="0"/>
           </a:xfrm>
           <a:prstGeom prst="line">
@@ -12051,10 +12064,10 @@
       </p:cxnSp>
       <p:sp>
         <p:nvSpPr>
-          <p:cNvPr id="21" name="TextBox 20">
-            <a:extLst>
-              <a:ext uri="{FF2B5EF4-FFF2-40B4-BE49-F238E27FC236}">
-                <a16:creationId xmlns:a16="http://schemas.microsoft.com/office/drawing/2014/main" id="{3419BB92-B2CF-41F7-8017-A837F9C8097D}"/>
+          <p:cNvPr id="22" name="TextBox 21">
+            <a:extLst>
+              <a:ext uri="{FF2B5EF4-FFF2-40B4-BE49-F238E27FC236}">
+                <a16:creationId xmlns:a16="http://schemas.microsoft.com/office/drawing/2014/main" id="{B302F7A3-88BD-4D80-A496-DF25467EF2C5}"/>
               </a:ext>
             </a:extLst>
           </p:cNvPr>
@@ -12063,48 +12076,7 @@
         </p:nvSpPr>
         <p:spPr>
           <a:xfrm>
-            <a:off x="184316" y="2486848"/>
-            <a:ext cx="1655906" cy="400110"/>
-          </a:xfrm>
-          <a:prstGeom prst="rect">
-            <a:avLst/>
-          </a:prstGeom>
-          <a:noFill/>
-        </p:spPr>
-        <p:txBody>
-          <a:bodyPr wrap="square" rtlCol="0">
-            <a:spAutoFit/>
-          </a:bodyPr>
-          <a:lstStyle/>
-          <a:p>
-            <a:r>
-              <a:rPr lang="en-US" sz="2000" dirty="0">
-                <a:solidFill>
-                  <a:schemeClr val="bg1">
-                    <a:lumMod val="65000"/>
-                  </a:schemeClr>
-                </a:solidFill>
-              </a:rPr>
-              <a:t>Reward Points</a:t>
-            </a:r>
-          </a:p>
-        </p:txBody>
-      </p:sp>
-      <p:sp>
-        <p:nvSpPr>
-          <p:cNvPr id="22" name="TextBox 21">
-            <a:extLst>
-              <a:ext uri="{FF2B5EF4-FFF2-40B4-BE49-F238E27FC236}">
-                <a16:creationId xmlns:a16="http://schemas.microsoft.com/office/drawing/2014/main" id="{B302F7A3-88BD-4D80-A496-DF25467EF2C5}"/>
-              </a:ext>
-            </a:extLst>
-          </p:cNvPr>
-          <p:cNvSpPr txBox="1"/>
-          <p:nvPr/>
-        </p:nvSpPr>
-        <p:spPr>
-          <a:xfrm>
-            <a:off x="184316" y="3170173"/>
+            <a:off x="192741" y="2509138"/>
             <a:ext cx="1655906" cy="400110"/>
           </a:xfrm>
           <a:prstGeom prst="rect">
@@ -12145,7 +12117,7 @@
         </p:nvSpPr>
         <p:spPr>
           <a:xfrm>
-            <a:off x="184316" y="3853498"/>
+            <a:off x="274183" y="3167810"/>
             <a:ext cx="1655906" cy="400110"/>
           </a:xfrm>
           <a:prstGeom prst="rect">
@@ -12242,7 +12214,7 @@
         </p:nvCxnSpPr>
         <p:spPr>
           <a:xfrm>
-            <a:off x="2" y="5059483"/>
+            <a:off x="0" y="4443839"/>
             <a:ext cx="2331090" cy="0"/>
           </a:xfrm>
           <a:prstGeom prst="line">
@@ -12285,7 +12257,7 @@
         </p:nvSpPr>
         <p:spPr>
           <a:xfrm>
-            <a:off x="184316" y="4536824"/>
+            <a:off x="274183" y="3911063"/>
             <a:ext cx="1655906" cy="400110"/>
           </a:xfrm>
           <a:prstGeom prst="rect">
@@ -13841,10 +13813,10 @@
       </p:cxnSp>
       <p:cxnSp>
         <p:nvCxnSpPr>
-          <p:cNvPr id="16" name="Straight Connector 15">
-            <a:extLst>
-              <a:ext uri="{FF2B5EF4-FFF2-40B4-BE49-F238E27FC236}">
-                <a16:creationId xmlns:a16="http://schemas.microsoft.com/office/drawing/2014/main" id="{EB5D56B5-FE00-4873-8858-5D6DE5BB5B44}"/>
+          <p:cNvPr id="17" name="Straight Connector 16">
+            <a:extLst>
+              <a:ext uri="{FF2B5EF4-FFF2-40B4-BE49-F238E27FC236}">
+                <a16:creationId xmlns:a16="http://schemas.microsoft.com/office/drawing/2014/main" id="{10C5BD50-390E-4208-B1E6-1AA61F8840FC}"/>
               </a:ext>
             </a:extLst>
           </p:cNvPr>
@@ -13855,52 +13827,7 @@
         </p:nvCxnSpPr>
         <p:spPr>
           <a:xfrm>
-            <a:off x="0" y="2981606"/>
-            <a:ext cx="2331090" cy="0"/>
-          </a:xfrm>
-          <a:prstGeom prst="line">
-            <a:avLst/>
-          </a:prstGeom>
-          <a:ln w="34925">
-            <a:solidFill>
-              <a:schemeClr val="bg1">
-                <a:lumMod val="85000"/>
-              </a:schemeClr>
-            </a:solidFill>
-          </a:ln>
-        </p:spPr>
-        <p:style>
-          <a:lnRef idx="1">
-            <a:schemeClr val="accent1"/>
-          </a:lnRef>
-          <a:fillRef idx="0">
-            <a:schemeClr val="accent1"/>
-          </a:fillRef>
-          <a:effectRef idx="0">
-            <a:schemeClr val="accent1"/>
-          </a:effectRef>
-          <a:fontRef idx="minor">
-            <a:schemeClr val="tx1"/>
-          </a:fontRef>
-        </p:style>
-      </p:cxnSp>
-      <p:cxnSp>
-        <p:nvCxnSpPr>
-          <p:cNvPr id="17" name="Straight Connector 16">
-            <a:extLst>
-              <a:ext uri="{FF2B5EF4-FFF2-40B4-BE49-F238E27FC236}">
-                <a16:creationId xmlns:a16="http://schemas.microsoft.com/office/drawing/2014/main" id="{10C5BD50-390E-4208-B1E6-1AA61F8840FC}"/>
-              </a:ext>
-            </a:extLst>
-          </p:cNvPr>
-          <p:cNvCxnSpPr>
-            <a:cxnSpLocks/>
-          </p:cNvCxnSpPr>
-          <p:nvPr/>
-        </p:nvCxnSpPr>
-        <p:spPr>
-          <a:xfrm>
-            <a:off x="3495" y="3718623"/>
+            <a:off x="3495" y="2997263"/>
             <a:ext cx="2331090" cy="0"/>
           </a:xfrm>
           <a:prstGeom prst="line">
@@ -13945,7 +13872,7 @@
         </p:nvCxnSpPr>
         <p:spPr>
           <a:xfrm>
-            <a:off x="3495" y="4395679"/>
+            <a:off x="3495" y="3674319"/>
             <a:ext cx="2331090" cy="0"/>
           </a:xfrm>
           <a:prstGeom prst="line">
@@ -13976,10 +13903,10 @@
       </p:cxnSp>
       <p:sp>
         <p:nvSpPr>
-          <p:cNvPr id="21" name="TextBox 20">
-            <a:extLst>
-              <a:ext uri="{FF2B5EF4-FFF2-40B4-BE49-F238E27FC236}">
-                <a16:creationId xmlns:a16="http://schemas.microsoft.com/office/drawing/2014/main" id="{3419BB92-B2CF-41F7-8017-A837F9C8097D}"/>
+          <p:cNvPr id="22" name="TextBox 21">
+            <a:extLst>
+              <a:ext uri="{FF2B5EF4-FFF2-40B4-BE49-F238E27FC236}">
+                <a16:creationId xmlns:a16="http://schemas.microsoft.com/office/drawing/2014/main" id="{B302F7A3-88BD-4D80-A496-DF25467EF2C5}"/>
               </a:ext>
             </a:extLst>
           </p:cNvPr>
@@ -13988,48 +13915,7 @@
         </p:nvSpPr>
         <p:spPr>
           <a:xfrm>
-            <a:off x="184316" y="2486848"/>
-            <a:ext cx="1655906" cy="400110"/>
-          </a:xfrm>
-          <a:prstGeom prst="rect">
-            <a:avLst/>
-          </a:prstGeom>
-          <a:noFill/>
-        </p:spPr>
-        <p:txBody>
-          <a:bodyPr wrap="square" rtlCol="0">
-            <a:spAutoFit/>
-          </a:bodyPr>
-          <a:lstStyle/>
-          <a:p>
-            <a:r>
-              <a:rPr lang="en-US" sz="2000" dirty="0">
-                <a:solidFill>
-                  <a:schemeClr val="bg1">
-                    <a:lumMod val="65000"/>
-                  </a:schemeClr>
-                </a:solidFill>
-              </a:rPr>
-              <a:t>Reward Points</a:t>
-            </a:r>
-          </a:p>
-        </p:txBody>
-      </p:sp>
-      <p:sp>
-        <p:nvSpPr>
-          <p:cNvPr id="22" name="TextBox 21">
-            <a:extLst>
-              <a:ext uri="{FF2B5EF4-FFF2-40B4-BE49-F238E27FC236}">
-                <a16:creationId xmlns:a16="http://schemas.microsoft.com/office/drawing/2014/main" id="{B302F7A3-88BD-4D80-A496-DF25467EF2C5}"/>
-              </a:ext>
-            </a:extLst>
-          </p:cNvPr>
-          <p:cNvSpPr txBox="1"/>
-          <p:nvPr/>
-        </p:nvSpPr>
-        <p:spPr>
-          <a:xfrm>
-            <a:off x="184316" y="3170173"/>
+            <a:off x="184316" y="2448813"/>
             <a:ext cx="1655906" cy="400110"/>
           </a:xfrm>
           <a:prstGeom prst="rect">
@@ -14070,7 +13956,7 @@
         </p:nvSpPr>
         <p:spPr>
           <a:xfrm>
-            <a:off x="184316" y="3853498"/>
+            <a:off x="184316" y="3132138"/>
             <a:ext cx="1655906" cy="400110"/>
           </a:xfrm>
           <a:prstGeom prst="rect">
@@ -14167,7 +14053,7 @@
         </p:nvCxnSpPr>
         <p:spPr>
           <a:xfrm>
-            <a:off x="2" y="5059483"/>
+            <a:off x="2" y="4338123"/>
             <a:ext cx="2331090" cy="0"/>
           </a:xfrm>
           <a:prstGeom prst="line">
@@ -14210,7 +14096,7 @@
         </p:nvSpPr>
         <p:spPr>
           <a:xfrm>
-            <a:off x="184316" y="4536824"/>
+            <a:off x="184316" y="3815464"/>
             <a:ext cx="1655906" cy="400110"/>
           </a:xfrm>
           <a:prstGeom prst="rect">
@@ -16078,10 +15964,10 @@
       </p:cxnSp>
       <p:cxnSp>
         <p:nvCxnSpPr>
-          <p:cNvPr id="16" name="Straight Connector 15">
-            <a:extLst>
-              <a:ext uri="{FF2B5EF4-FFF2-40B4-BE49-F238E27FC236}">
-                <a16:creationId xmlns:a16="http://schemas.microsoft.com/office/drawing/2014/main" id="{EB5D56B5-FE00-4873-8858-5D6DE5BB5B44}"/>
+          <p:cNvPr id="17" name="Straight Connector 16">
+            <a:extLst>
+              <a:ext uri="{FF2B5EF4-FFF2-40B4-BE49-F238E27FC236}">
+                <a16:creationId xmlns:a16="http://schemas.microsoft.com/office/drawing/2014/main" id="{10C5BD50-390E-4208-B1E6-1AA61F8840FC}"/>
               </a:ext>
             </a:extLst>
           </p:cNvPr>
@@ -16092,52 +15978,7 @@
         </p:nvCxnSpPr>
         <p:spPr>
           <a:xfrm>
-            <a:off x="0" y="2981606"/>
-            <a:ext cx="2331090" cy="0"/>
-          </a:xfrm>
-          <a:prstGeom prst="line">
-            <a:avLst/>
-          </a:prstGeom>
-          <a:ln w="34925">
-            <a:solidFill>
-              <a:schemeClr val="bg1">
-                <a:lumMod val="85000"/>
-              </a:schemeClr>
-            </a:solidFill>
-          </a:ln>
-        </p:spPr>
-        <p:style>
-          <a:lnRef idx="1">
-            <a:schemeClr val="accent1"/>
-          </a:lnRef>
-          <a:fillRef idx="0">
-            <a:schemeClr val="accent1"/>
-          </a:fillRef>
-          <a:effectRef idx="0">
-            <a:schemeClr val="accent1"/>
-          </a:effectRef>
-          <a:fontRef idx="minor">
-            <a:schemeClr val="tx1"/>
-          </a:fontRef>
-        </p:style>
-      </p:cxnSp>
-      <p:cxnSp>
-        <p:nvCxnSpPr>
-          <p:cNvPr id="17" name="Straight Connector 16">
-            <a:extLst>
-              <a:ext uri="{FF2B5EF4-FFF2-40B4-BE49-F238E27FC236}">
-                <a16:creationId xmlns:a16="http://schemas.microsoft.com/office/drawing/2014/main" id="{10C5BD50-390E-4208-B1E6-1AA61F8840FC}"/>
-              </a:ext>
-            </a:extLst>
-          </p:cNvPr>
-          <p:cNvCxnSpPr>
-            <a:cxnSpLocks/>
-          </p:cNvCxnSpPr>
-          <p:nvPr/>
-        </p:nvCxnSpPr>
-        <p:spPr>
-          <a:xfrm>
-            <a:off x="3495" y="3718623"/>
+            <a:off x="3495" y="3017583"/>
             <a:ext cx="2331090" cy="0"/>
           </a:xfrm>
           <a:prstGeom prst="line">
@@ -16182,7 +16023,7 @@
         </p:nvCxnSpPr>
         <p:spPr>
           <a:xfrm>
-            <a:off x="3495" y="4395679"/>
+            <a:off x="3495" y="3694639"/>
             <a:ext cx="2331090" cy="0"/>
           </a:xfrm>
           <a:prstGeom prst="line">
@@ -16213,10 +16054,10 @@
       </p:cxnSp>
       <p:sp>
         <p:nvSpPr>
-          <p:cNvPr id="21" name="TextBox 20">
-            <a:extLst>
-              <a:ext uri="{FF2B5EF4-FFF2-40B4-BE49-F238E27FC236}">
-                <a16:creationId xmlns:a16="http://schemas.microsoft.com/office/drawing/2014/main" id="{3419BB92-B2CF-41F7-8017-A837F9C8097D}"/>
+          <p:cNvPr id="22" name="TextBox 21">
+            <a:extLst>
+              <a:ext uri="{FF2B5EF4-FFF2-40B4-BE49-F238E27FC236}">
+                <a16:creationId xmlns:a16="http://schemas.microsoft.com/office/drawing/2014/main" id="{B302F7A3-88BD-4D80-A496-DF25467EF2C5}"/>
               </a:ext>
             </a:extLst>
           </p:cNvPr>
@@ -16225,48 +16066,7 @@
         </p:nvSpPr>
         <p:spPr>
           <a:xfrm>
-            <a:off x="184316" y="2486848"/>
-            <a:ext cx="1655906" cy="400110"/>
-          </a:xfrm>
-          <a:prstGeom prst="rect">
-            <a:avLst/>
-          </a:prstGeom>
-          <a:noFill/>
-        </p:spPr>
-        <p:txBody>
-          <a:bodyPr wrap="square" rtlCol="0">
-            <a:spAutoFit/>
-          </a:bodyPr>
-          <a:lstStyle/>
-          <a:p>
-            <a:r>
-              <a:rPr lang="en-US" sz="2000" dirty="0">
-                <a:solidFill>
-                  <a:schemeClr val="bg1">
-                    <a:lumMod val="65000"/>
-                  </a:schemeClr>
-                </a:solidFill>
-              </a:rPr>
-              <a:t>Reward Points</a:t>
-            </a:r>
-          </a:p>
-        </p:txBody>
-      </p:sp>
-      <p:sp>
-        <p:nvSpPr>
-          <p:cNvPr id="22" name="TextBox 21">
-            <a:extLst>
-              <a:ext uri="{FF2B5EF4-FFF2-40B4-BE49-F238E27FC236}">
-                <a16:creationId xmlns:a16="http://schemas.microsoft.com/office/drawing/2014/main" id="{B302F7A3-88BD-4D80-A496-DF25467EF2C5}"/>
-              </a:ext>
-            </a:extLst>
-          </p:cNvPr>
-          <p:cNvSpPr txBox="1"/>
-          <p:nvPr/>
-        </p:nvSpPr>
-        <p:spPr>
-          <a:xfrm>
-            <a:off x="184316" y="3170173"/>
+            <a:off x="184316" y="2469133"/>
             <a:ext cx="1655906" cy="400110"/>
           </a:xfrm>
           <a:prstGeom prst="rect">
@@ -16307,7 +16107,7 @@
         </p:nvSpPr>
         <p:spPr>
           <a:xfrm>
-            <a:off x="184316" y="3853498"/>
+            <a:off x="184316" y="3152458"/>
             <a:ext cx="1655906" cy="400110"/>
           </a:xfrm>
           <a:prstGeom prst="rect">
@@ -16404,7 +16204,7 @@
         </p:nvCxnSpPr>
         <p:spPr>
           <a:xfrm>
-            <a:off x="2" y="5059483"/>
+            <a:off x="2" y="4358443"/>
             <a:ext cx="2331090" cy="0"/>
           </a:xfrm>
           <a:prstGeom prst="line">
@@ -16447,7 +16247,7 @@
         </p:nvSpPr>
         <p:spPr>
           <a:xfrm>
-            <a:off x="184316" y="4536824"/>
+            <a:off x="184316" y="3835784"/>
             <a:ext cx="1655906" cy="400110"/>
           </a:xfrm>
           <a:prstGeom prst="rect">
@@ -19042,10 +18842,10 @@
       </p:cxnSp>
       <p:cxnSp>
         <p:nvCxnSpPr>
-          <p:cNvPr id="16" name="Straight Connector 15">
-            <a:extLst>
-              <a:ext uri="{FF2B5EF4-FFF2-40B4-BE49-F238E27FC236}">
-                <a16:creationId xmlns:a16="http://schemas.microsoft.com/office/drawing/2014/main" id="{EB5D56B5-FE00-4873-8858-5D6DE5BB5B44}"/>
+          <p:cNvPr id="17" name="Straight Connector 16">
+            <a:extLst>
+              <a:ext uri="{FF2B5EF4-FFF2-40B4-BE49-F238E27FC236}">
+                <a16:creationId xmlns:a16="http://schemas.microsoft.com/office/drawing/2014/main" id="{10C5BD50-390E-4208-B1E6-1AA61F8840FC}"/>
               </a:ext>
             </a:extLst>
           </p:cNvPr>
@@ -19056,52 +18856,7 @@
         </p:nvCxnSpPr>
         <p:spPr>
           <a:xfrm>
-            <a:off x="0" y="2981606"/>
-            <a:ext cx="2331090" cy="0"/>
-          </a:xfrm>
-          <a:prstGeom prst="line">
-            <a:avLst/>
-          </a:prstGeom>
-          <a:ln w="34925">
-            <a:solidFill>
-              <a:schemeClr val="bg1">
-                <a:lumMod val="85000"/>
-              </a:schemeClr>
-            </a:solidFill>
-          </a:ln>
-        </p:spPr>
-        <p:style>
-          <a:lnRef idx="1">
-            <a:schemeClr val="accent1"/>
-          </a:lnRef>
-          <a:fillRef idx="0">
-            <a:schemeClr val="accent1"/>
-          </a:fillRef>
-          <a:effectRef idx="0">
-            <a:schemeClr val="accent1"/>
-          </a:effectRef>
-          <a:fontRef idx="minor">
-            <a:schemeClr val="tx1"/>
-          </a:fontRef>
-        </p:style>
-      </p:cxnSp>
-      <p:cxnSp>
-        <p:nvCxnSpPr>
-          <p:cNvPr id="17" name="Straight Connector 16">
-            <a:extLst>
-              <a:ext uri="{FF2B5EF4-FFF2-40B4-BE49-F238E27FC236}">
-                <a16:creationId xmlns:a16="http://schemas.microsoft.com/office/drawing/2014/main" id="{10C5BD50-390E-4208-B1E6-1AA61F8840FC}"/>
-              </a:ext>
-            </a:extLst>
-          </p:cNvPr>
-          <p:cNvCxnSpPr>
-            <a:cxnSpLocks/>
-          </p:cNvCxnSpPr>
-          <p:nvPr/>
-        </p:nvCxnSpPr>
-        <p:spPr>
-          <a:xfrm>
-            <a:off x="3495" y="3718623"/>
+            <a:off x="3495" y="2997263"/>
             <a:ext cx="2331090" cy="0"/>
           </a:xfrm>
           <a:prstGeom prst="line">
@@ -19146,7 +18901,7 @@
         </p:nvCxnSpPr>
         <p:spPr>
           <a:xfrm>
-            <a:off x="3495" y="4395679"/>
+            <a:off x="3495" y="3674319"/>
             <a:ext cx="2331090" cy="0"/>
           </a:xfrm>
           <a:prstGeom prst="line">
@@ -19177,10 +18932,10 @@
       </p:cxnSp>
       <p:sp>
         <p:nvSpPr>
-          <p:cNvPr id="21" name="TextBox 20">
-            <a:extLst>
-              <a:ext uri="{FF2B5EF4-FFF2-40B4-BE49-F238E27FC236}">
-                <a16:creationId xmlns:a16="http://schemas.microsoft.com/office/drawing/2014/main" id="{3419BB92-B2CF-41F7-8017-A837F9C8097D}"/>
+          <p:cNvPr id="22" name="TextBox 21">
+            <a:extLst>
+              <a:ext uri="{FF2B5EF4-FFF2-40B4-BE49-F238E27FC236}">
+                <a16:creationId xmlns:a16="http://schemas.microsoft.com/office/drawing/2014/main" id="{B302F7A3-88BD-4D80-A496-DF25467EF2C5}"/>
               </a:ext>
             </a:extLst>
           </p:cNvPr>
@@ -19189,48 +18944,7 @@
         </p:nvSpPr>
         <p:spPr>
           <a:xfrm>
-            <a:off x="184316" y="2486848"/>
-            <a:ext cx="1655906" cy="400110"/>
-          </a:xfrm>
-          <a:prstGeom prst="rect">
-            <a:avLst/>
-          </a:prstGeom>
-          <a:noFill/>
-        </p:spPr>
-        <p:txBody>
-          <a:bodyPr wrap="square" rtlCol="0">
-            <a:spAutoFit/>
-          </a:bodyPr>
-          <a:lstStyle/>
-          <a:p>
-            <a:r>
-              <a:rPr lang="en-US" sz="2000" dirty="0">
-                <a:solidFill>
-                  <a:schemeClr val="bg1">
-                    <a:lumMod val="65000"/>
-                  </a:schemeClr>
-                </a:solidFill>
-              </a:rPr>
-              <a:t>Reward Points</a:t>
-            </a:r>
-          </a:p>
-        </p:txBody>
-      </p:sp>
-      <p:sp>
-        <p:nvSpPr>
-          <p:cNvPr id="22" name="TextBox 21">
-            <a:extLst>
-              <a:ext uri="{FF2B5EF4-FFF2-40B4-BE49-F238E27FC236}">
-                <a16:creationId xmlns:a16="http://schemas.microsoft.com/office/drawing/2014/main" id="{B302F7A3-88BD-4D80-A496-DF25467EF2C5}"/>
-              </a:ext>
-            </a:extLst>
-          </p:cNvPr>
-          <p:cNvSpPr txBox="1"/>
-          <p:nvPr/>
-        </p:nvSpPr>
-        <p:spPr>
-          <a:xfrm>
-            <a:off x="184316" y="3170173"/>
+            <a:off x="184316" y="2448813"/>
             <a:ext cx="1655906" cy="400110"/>
           </a:xfrm>
           <a:prstGeom prst="rect">
@@ -19271,7 +18985,7 @@
         </p:nvSpPr>
         <p:spPr>
           <a:xfrm>
-            <a:off x="184316" y="3853498"/>
+            <a:off x="184316" y="3132138"/>
             <a:ext cx="1655906" cy="400110"/>
           </a:xfrm>
           <a:prstGeom prst="rect">
@@ -19368,7 +19082,7 @@
         </p:nvCxnSpPr>
         <p:spPr>
           <a:xfrm>
-            <a:off x="2" y="5059483"/>
+            <a:off x="2" y="4338123"/>
             <a:ext cx="2331090" cy="0"/>
           </a:xfrm>
           <a:prstGeom prst="line">
@@ -19411,7 +19125,7 @@
         </p:nvSpPr>
         <p:spPr>
           <a:xfrm>
-            <a:off x="184316" y="4536824"/>
+            <a:off x="184316" y="3815464"/>
             <a:ext cx="1655906" cy="400110"/>
           </a:xfrm>
           <a:prstGeom prst="rect">
@@ -22376,10 +22090,10 @@
       </p:cxnSp>
       <p:cxnSp>
         <p:nvCxnSpPr>
-          <p:cNvPr id="16" name="Straight Connector 15">
-            <a:extLst>
-              <a:ext uri="{FF2B5EF4-FFF2-40B4-BE49-F238E27FC236}">
-                <a16:creationId xmlns:a16="http://schemas.microsoft.com/office/drawing/2014/main" id="{EB5D56B5-FE00-4873-8858-5D6DE5BB5B44}"/>
+          <p:cNvPr id="17" name="Straight Connector 16">
+            <a:extLst>
+              <a:ext uri="{FF2B5EF4-FFF2-40B4-BE49-F238E27FC236}">
+                <a16:creationId xmlns:a16="http://schemas.microsoft.com/office/drawing/2014/main" id="{10C5BD50-390E-4208-B1E6-1AA61F8840FC}"/>
               </a:ext>
             </a:extLst>
           </p:cNvPr>
@@ -22390,52 +22104,7 @@
         </p:nvCxnSpPr>
         <p:spPr>
           <a:xfrm>
-            <a:off x="0" y="2981606"/>
-            <a:ext cx="2331090" cy="0"/>
-          </a:xfrm>
-          <a:prstGeom prst="line">
-            <a:avLst/>
-          </a:prstGeom>
-          <a:ln w="34925">
-            <a:solidFill>
-              <a:schemeClr val="bg1">
-                <a:lumMod val="85000"/>
-              </a:schemeClr>
-            </a:solidFill>
-          </a:ln>
-        </p:spPr>
-        <p:style>
-          <a:lnRef idx="1">
-            <a:schemeClr val="accent1"/>
-          </a:lnRef>
-          <a:fillRef idx="0">
-            <a:schemeClr val="accent1"/>
-          </a:fillRef>
-          <a:effectRef idx="0">
-            <a:schemeClr val="accent1"/>
-          </a:effectRef>
-          <a:fontRef idx="minor">
-            <a:schemeClr val="tx1"/>
-          </a:fontRef>
-        </p:style>
-      </p:cxnSp>
-      <p:cxnSp>
-        <p:nvCxnSpPr>
-          <p:cNvPr id="17" name="Straight Connector 16">
-            <a:extLst>
-              <a:ext uri="{FF2B5EF4-FFF2-40B4-BE49-F238E27FC236}">
-                <a16:creationId xmlns:a16="http://schemas.microsoft.com/office/drawing/2014/main" id="{10C5BD50-390E-4208-B1E6-1AA61F8840FC}"/>
-              </a:ext>
-            </a:extLst>
-          </p:cNvPr>
-          <p:cNvCxnSpPr>
-            <a:cxnSpLocks/>
-          </p:cNvCxnSpPr>
-          <p:nvPr/>
-        </p:nvCxnSpPr>
-        <p:spPr>
-          <a:xfrm>
-            <a:off x="3495" y="3718623"/>
+            <a:off x="3495" y="2997263"/>
             <a:ext cx="2331090" cy="0"/>
           </a:xfrm>
           <a:prstGeom prst="line">
@@ -22480,7 +22149,7 @@
         </p:nvCxnSpPr>
         <p:spPr>
           <a:xfrm>
-            <a:off x="3495" y="4395679"/>
+            <a:off x="3495" y="3674319"/>
             <a:ext cx="2331090" cy="0"/>
           </a:xfrm>
           <a:prstGeom prst="line">
@@ -22511,10 +22180,10 @@
       </p:cxnSp>
       <p:sp>
         <p:nvSpPr>
-          <p:cNvPr id="21" name="TextBox 20">
-            <a:extLst>
-              <a:ext uri="{FF2B5EF4-FFF2-40B4-BE49-F238E27FC236}">
-                <a16:creationId xmlns:a16="http://schemas.microsoft.com/office/drawing/2014/main" id="{3419BB92-B2CF-41F7-8017-A837F9C8097D}"/>
+          <p:cNvPr id="22" name="TextBox 21">
+            <a:extLst>
+              <a:ext uri="{FF2B5EF4-FFF2-40B4-BE49-F238E27FC236}">
+                <a16:creationId xmlns:a16="http://schemas.microsoft.com/office/drawing/2014/main" id="{B302F7A3-88BD-4D80-A496-DF25467EF2C5}"/>
               </a:ext>
             </a:extLst>
           </p:cNvPr>
@@ -22523,48 +22192,7 @@
         </p:nvSpPr>
         <p:spPr>
           <a:xfrm>
-            <a:off x="184316" y="2486848"/>
-            <a:ext cx="1655906" cy="400110"/>
-          </a:xfrm>
-          <a:prstGeom prst="rect">
-            <a:avLst/>
-          </a:prstGeom>
-          <a:noFill/>
-        </p:spPr>
-        <p:txBody>
-          <a:bodyPr wrap="square" rtlCol="0">
-            <a:spAutoFit/>
-          </a:bodyPr>
-          <a:lstStyle/>
-          <a:p>
-            <a:r>
-              <a:rPr lang="en-US" sz="2000" dirty="0">
-                <a:solidFill>
-                  <a:schemeClr val="bg1">
-                    <a:lumMod val="65000"/>
-                  </a:schemeClr>
-                </a:solidFill>
-              </a:rPr>
-              <a:t>Reward Points</a:t>
-            </a:r>
-          </a:p>
-        </p:txBody>
-      </p:sp>
-      <p:sp>
-        <p:nvSpPr>
-          <p:cNvPr id="22" name="TextBox 21">
-            <a:extLst>
-              <a:ext uri="{FF2B5EF4-FFF2-40B4-BE49-F238E27FC236}">
-                <a16:creationId xmlns:a16="http://schemas.microsoft.com/office/drawing/2014/main" id="{B302F7A3-88BD-4D80-A496-DF25467EF2C5}"/>
-              </a:ext>
-            </a:extLst>
-          </p:cNvPr>
-          <p:cNvSpPr txBox="1"/>
-          <p:nvPr/>
-        </p:nvSpPr>
-        <p:spPr>
-          <a:xfrm>
-            <a:off x="184316" y="3170173"/>
+            <a:off x="184316" y="2448813"/>
             <a:ext cx="1655906" cy="400110"/>
           </a:xfrm>
           <a:prstGeom prst="rect">
@@ -22605,7 +22233,7 @@
         </p:nvSpPr>
         <p:spPr>
           <a:xfrm>
-            <a:off x="184316" y="3853498"/>
+            <a:off x="184316" y="3132138"/>
             <a:ext cx="1655906" cy="400110"/>
           </a:xfrm>
           <a:prstGeom prst="rect">
@@ -22702,7 +22330,7 @@
         </p:nvCxnSpPr>
         <p:spPr>
           <a:xfrm>
-            <a:off x="2" y="5059483"/>
+            <a:off x="2" y="4338123"/>
             <a:ext cx="2331090" cy="0"/>
           </a:xfrm>
           <a:prstGeom prst="line">
@@ -22745,7 +22373,7 @@
         </p:nvSpPr>
         <p:spPr>
           <a:xfrm>
-            <a:off x="184316" y="4536824"/>
+            <a:off x="184316" y="3815464"/>
             <a:ext cx="1655906" cy="400110"/>
           </a:xfrm>
           <a:prstGeom prst="rect">

</xml_diff>